<commit_message>
creating basic slide outline
</commit_message>
<xml_diff>
--- a/presentation.pptx
+++ b/presentation.pptx
@@ -3116,7 +3116,7 @@
             </a:pPr>
             <a:r>
               <a:rPr/>
-              <a:t>Data 322 Study Group Recommender</a:t>
+              <a:t>Study Group Recommender with Machine Learning</a:t>
             </a:r>
           </a:p>
         </p:txBody>
@@ -3144,6 +3144,10 @@
             <a:pPr lvl="0" indent="0" marL="0">
               <a:buNone/>
             </a:pPr>
+            <a:r>
+              <a:rPr/>
+              <a:t>Developed: by class of Presented: by Team Machines</a:t>
+            </a:r>
             <a:br/>
             <a:br/>
           </a:p>

</xml_diff>

<commit_message>
making equal slides to current slideshow
</commit_message>
<xml_diff>
--- a/presentation.pptx
+++ b/presentation.pptx
@@ -7,6 +7,15 @@
   <p:sldIdLst>
     <p:sldId id="256" r:id="rId2"/>
     <p:sldId id="257" r:id="rId3"/>
+    <p:sldId id="258" r:id="rId4"/>
+    <p:sldId id="259" r:id="rId5"/>
+    <p:sldId id="260" r:id="rId6"/>
+    <p:sldId id="261" r:id="rId7"/>
+    <p:sldId id="262" r:id="rId8"/>
+    <p:sldId id="263" r:id="rId9"/>
+    <p:sldId id="264" r:id="rId10"/>
+    <p:sldId id="265" r:id="rId11"/>
+    <p:sldId id="266" r:id="rId12"/>
   </p:sldIdLst>
   <p:sldSz cx="9144000" cy="5143500" type="screen16x9"/>
   <p:notesSz cx="6858000" cy="9144000"/>
@@ -3146,10 +3155,192 @@
             </a:pPr>
             <a:r>
               <a:rPr/>
-              <a:t>Developed: by class of Presented: by Team Machines</a:t>
+              <a:t>Developed: by class of DATA322 Presented: by Team Machines</a:t>
             </a:r>
             <a:br/>
             <a:br/>
+          </a:p>
+        </p:txBody>
+      </p:sp>
+    </p:spTree>
+  </p:cSld>
+</p:sld>
+</file>
+
+<file path=ppt/slides/slide10.xml><?xml version="1.0" encoding="utf-8"?>
+<p:sld xmlns:a="http://schemas.openxmlformats.org/drawingml/2006/main" xmlns:r="http://schemas.openxmlformats.org/officeDocument/2006/relationships" xmlns:p="http://schemas.openxmlformats.org/presentationml/2006/main">
+  <p:cSld>
+    <p:spTree>
+      <p:nvGrpSpPr>
+        <p:cNvPr id="1" name=""/>
+        <p:cNvGrpSpPr/>
+        <p:nvPr/>
+      </p:nvGrpSpPr>
+      <p:grpSpPr>
+        <a:xfrm>
+          <a:off x="0" y="0"/>
+          <a:ext cx="0" cy="0"/>
+          <a:chOff x="0" y="0"/>
+          <a:chExt cx="0" cy="0"/>
+        </a:xfrm>
+      </p:grpSpPr>
+      <p:sp>
+        <p:nvSpPr>
+          <p:cNvPr id="2" name="Title 1"/>
+          <p:cNvSpPr>
+            <a:spLocks noGrp="1"/>
+          </p:cNvSpPr>
+          <p:nvPr>
+            <p:ph type="title"/>
+          </p:nvPr>
+        </p:nvSpPr>
+        <p:spPr/>
+        <p:txBody>
+          <a:bodyPr/>
+          <a:lstStyle/>
+          <a:p>
+            <a:pPr lvl="0" indent="0" marL="0">
+              <a:buNone/>
+            </a:pPr>
+            <a:r>
+              <a:rPr/>
+              <a:t>Evaluation Form (from Presenting Team)</a:t>
+            </a:r>
+          </a:p>
+        </p:txBody>
+      </p:sp>
+      <p:sp>
+        <p:nvSpPr>
+          <p:cNvPr id="3" name="Content Placeholder 2"/>
+          <p:cNvSpPr>
+            <a:spLocks noGrp="1"/>
+          </p:cNvSpPr>
+          <p:nvPr>
+            <p:ph idx="1"/>
+          </p:nvPr>
+        </p:nvSpPr>
+        <p:spPr/>
+        <p:txBody>
+          <a:bodyPr/>
+          <a:lstStyle/>
+          <a:p>
+            <a:pPr lvl="0"/>
+            <a:r>
+              <a:rPr/>
+              <a:t>Url: https://forms.gle/mBq7GdZiLTy8Ydhf9</a:t>
+            </a:r>
+          </a:p>
+        </p:txBody>
+      </p:sp>
+    </p:spTree>
+  </p:cSld>
+</p:sld>
+</file>
+
+<file path=ppt/slides/slide11.xml><?xml version="1.0" encoding="utf-8"?>
+<p:sld xmlns:a="http://schemas.openxmlformats.org/drawingml/2006/main" xmlns:r="http://schemas.openxmlformats.org/officeDocument/2006/relationships" xmlns:p="http://schemas.openxmlformats.org/presentationml/2006/main">
+  <p:cSld>
+    <p:spTree>
+      <p:nvGrpSpPr>
+        <p:cNvPr id="1" name=""/>
+        <p:cNvGrpSpPr/>
+        <p:nvPr/>
+      </p:nvGrpSpPr>
+      <p:grpSpPr>
+        <a:xfrm>
+          <a:off x="0" y="0"/>
+          <a:ext cx="0" cy="0"/>
+          <a:chOff x="0" y="0"/>
+          <a:chExt cx="0" cy="0"/>
+        </a:xfrm>
+      </p:grpSpPr>
+      <p:sp>
+        <p:nvSpPr>
+          <p:cNvPr id="2" name="Title 1"/>
+          <p:cNvSpPr>
+            <a:spLocks noGrp="1"/>
+          </p:cNvSpPr>
+          <p:nvPr>
+            <p:ph type="title"/>
+          </p:nvPr>
+        </p:nvSpPr>
+        <p:spPr/>
+        <p:txBody>
+          <a:bodyPr/>
+          <a:lstStyle/>
+          <a:p>
+            <a:pPr lvl="0" indent="0" marL="0">
+              <a:buNone/>
+            </a:pPr>
+            <a:r>
+              <a:rPr/>
+              <a:t>Credits</a:t>
+            </a:r>
+          </a:p>
+        </p:txBody>
+      </p:sp>
+      <p:sp>
+        <p:nvSpPr>
+          <p:cNvPr id="3" name="Content Placeholder 2"/>
+          <p:cNvSpPr>
+            <a:spLocks noGrp="1"/>
+          </p:cNvSpPr>
+          <p:nvPr>
+            <p:ph idx="1"/>
+          </p:nvPr>
+        </p:nvSpPr>
+        <p:spPr/>
+        <p:txBody>
+          <a:bodyPr/>
+          <a:lstStyle/>
+          <a:p>
+            <a:pPr lvl="0"/>
+            <a:r>
+              <a:rPr/>
+              <a:t>Presented by Team Machines:</a:t>
+            </a:r>
+          </a:p>
+          <a:p>
+            <a:pPr lvl="1"/>
+            <a:r>
+              <a:rPr/>
+              <a:t>Anthony Wolfe - Job Title</a:t>
+            </a:r>
+          </a:p>
+          <a:p>
+            <a:pPr lvl="1"/>
+            <a:r>
+              <a:rPr/>
+              <a:t>Dean Callahan - Job Title</a:t>
+            </a:r>
+          </a:p>
+          <a:p>
+            <a:pPr lvl="1"/>
+            <a:r>
+              <a:rPr/>
+              <a:t>Jonathan Juarez - Job Title</a:t>
+            </a:r>
+          </a:p>
+          <a:p>
+            <a:pPr lvl="1"/>
+            <a:r>
+              <a:rPr/>
+              <a:t>Devon Walker - Job Title</a:t>
+            </a:r>
+          </a:p>
+          <a:p>
+            <a:pPr lvl="0"/>
+            <a:r>
+              <a:rPr/>
+              <a:t>Data and Question Design By: Team SARA</a:t>
+            </a:r>
+          </a:p>
+          <a:p>
+            <a:pPr lvl="0"/>
+            <a:r>
+              <a:rPr/>
+              <a:t>Distance and Clustering By: Team Errors</a:t>
+            </a:r>
           </a:p>
         </p:txBody>
       </p:sp>
@@ -3177,6 +3368,31 @@
       </p:grpSpPr>
       <p:sp>
         <p:nvSpPr>
+          <p:cNvPr id="2" name="Title 1"/>
+          <p:cNvSpPr>
+            <a:spLocks noGrp="1"/>
+          </p:cNvSpPr>
+          <p:nvPr>
+            <p:ph type="title"/>
+          </p:nvPr>
+        </p:nvSpPr>
+        <p:spPr/>
+        <p:txBody>
+          <a:bodyPr/>
+          <a:lstStyle/>
+          <a:p>
+            <a:pPr lvl="0" indent="0" marL="0">
+              <a:buNone/>
+            </a:pPr>
+            <a:r>
+              <a:rPr/>
+              <a:t>Problem Overview</a:t>
+            </a:r>
+          </a:p>
+        </p:txBody>
+      </p:sp>
+      <p:sp>
+        <p:nvSpPr>
           <p:cNvPr id="3" name="Content Placeholder 2"/>
           <p:cNvSpPr>
             <a:spLocks noGrp="1"/>
@@ -3198,6 +3414,335 @@
                 <a:latin typeface="Courier"/>
               </a:rPr>
               <a:t>Hello World</a:t>
+            </a:r>
+          </a:p>
+        </p:txBody>
+      </p:sp>
+    </p:spTree>
+  </p:cSld>
+</p:sld>
+</file>
+
+<file path=ppt/slides/slide3.xml><?xml version="1.0" encoding="utf-8"?>
+<p:sld xmlns:a="http://schemas.openxmlformats.org/drawingml/2006/main" xmlns:r="http://schemas.openxmlformats.org/officeDocument/2006/relationships" xmlns:p="http://schemas.openxmlformats.org/presentationml/2006/main">
+  <p:cSld>
+    <p:spTree>
+      <p:nvGrpSpPr>
+        <p:cNvPr id="1" name=""/>
+        <p:cNvGrpSpPr/>
+        <p:nvPr/>
+      </p:nvGrpSpPr>
+      <p:grpSpPr>
+        <a:xfrm>
+          <a:off x="0" y="0"/>
+          <a:ext cx="0" cy="0"/>
+          <a:chOff x="0" y="0"/>
+          <a:chExt cx="0" cy="0"/>
+        </a:xfrm>
+      </p:grpSpPr>
+      <p:sp>
+        <p:nvSpPr>
+          <p:cNvPr id="2" name="Title 1"/>
+          <p:cNvSpPr>
+            <a:spLocks noGrp="1"/>
+          </p:cNvSpPr>
+          <p:nvPr>
+            <p:ph type="title"/>
+          </p:nvPr>
+        </p:nvSpPr>
+        <p:spPr/>
+        <p:txBody>
+          <a:bodyPr/>
+          <a:lstStyle/>
+          <a:p>
+            <a:pPr lvl="0" indent="0" marL="0">
+              <a:buNone/>
+            </a:pPr>
+            <a:r>
+              <a:rPr/>
+              <a:t>Data Collection - Fill Out This Form!</a:t>
+            </a:r>
+          </a:p>
+        </p:txBody>
+      </p:sp>
+    </p:spTree>
+  </p:cSld>
+</p:sld>
+</file>
+
+<file path=ppt/slides/slide4.xml><?xml version="1.0" encoding="utf-8"?>
+<p:sld xmlns:a="http://schemas.openxmlformats.org/drawingml/2006/main" xmlns:r="http://schemas.openxmlformats.org/officeDocument/2006/relationships" xmlns:p="http://schemas.openxmlformats.org/presentationml/2006/main">
+  <p:cSld>
+    <p:spTree>
+      <p:nvGrpSpPr>
+        <p:cNvPr id="1" name=""/>
+        <p:cNvGrpSpPr/>
+        <p:nvPr/>
+      </p:nvGrpSpPr>
+      <p:grpSpPr>
+        <a:xfrm>
+          <a:off x="0" y="0"/>
+          <a:ext cx="0" cy="0"/>
+          <a:chOff x="0" y="0"/>
+          <a:chExt cx="0" cy="0"/>
+        </a:xfrm>
+      </p:grpSpPr>
+      <p:sp>
+        <p:nvSpPr>
+          <p:cNvPr id="2" name="Title 1"/>
+          <p:cNvSpPr>
+            <a:spLocks noGrp="1"/>
+          </p:cNvSpPr>
+          <p:nvPr>
+            <p:ph type="title"/>
+          </p:nvPr>
+        </p:nvSpPr>
+        <p:spPr/>
+        <p:txBody>
+          <a:bodyPr/>
+          <a:lstStyle/>
+          <a:p>
+            <a:pPr lvl="0" indent="0" marL="0">
+              <a:buNone/>
+            </a:pPr>
+            <a:r>
+              <a:rPr/>
+              <a:t>Tidy Data Collected</a:t>
+            </a:r>
+          </a:p>
+        </p:txBody>
+      </p:sp>
+    </p:spTree>
+  </p:cSld>
+</p:sld>
+</file>
+
+<file path=ppt/slides/slide5.xml><?xml version="1.0" encoding="utf-8"?>
+<p:sld xmlns:a="http://schemas.openxmlformats.org/drawingml/2006/main" xmlns:r="http://schemas.openxmlformats.org/officeDocument/2006/relationships" xmlns:p="http://schemas.openxmlformats.org/presentationml/2006/main">
+  <p:cSld>
+    <p:spTree>
+      <p:nvGrpSpPr>
+        <p:cNvPr id="1" name=""/>
+        <p:cNvGrpSpPr/>
+        <p:nvPr/>
+      </p:nvGrpSpPr>
+      <p:grpSpPr>
+        <a:xfrm>
+          <a:off x="0" y="0"/>
+          <a:ext cx="0" cy="0"/>
+          <a:chOff x="0" y="0"/>
+          <a:chExt cx="0" cy="0"/>
+        </a:xfrm>
+      </p:grpSpPr>
+      <p:sp>
+        <p:nvSpPr>
+          <p:cNvPr id="2" name="Title 1"/>
+          <p:cNvSpPr>
+            <a:spLocks noGrp="1"/>
+          </p:cNvSpPr>
+          <p:nvPr>
+            <p:ph type="title"/>
+          </p:nvPr>
+        </p:nvSpPr>
+        <p:spPr/>
+        <p:txBody>
+          <a:bodyPr/>
+          <a:lstStyle/>
+          <a:p>
+            <a:pPr lvl="0" indent="0" marL="0">
+              <a:buNone/>
+            </a:pPr>
+            <a:r>
+              <a:rPr/>
+              <a:t>Distance Definition</a:t>
+            </a:r>
+          </a:p>
+        </p:txBody>
+      </p:sp>
+    </p:spTree>
+  </p:cSld>
+</p:sld>
+</file>
+
+<file path=ppt/slides/slide6.xml><?xml version="1.0" encoding="utf-8"?>
+<p:sld xmlns:a="http://schemas.openxmlformats.org/drawingml/2006/main" xmlns:r="http://schemas.openxmlformats.org/officeDocument/2006/relationships" xmlns:p="http://schemas.openxmlformats.org/presentationml/2006/main">
+  <p:cSld>
+    <p:spTree>
+      <p:nvGrpSpPr>
+        <p:cNvPr id="1" name=""/>
+        <p:cNvGrpSpPr/>
+        <p:nvPr/>
+      </p:nvGrpSpPr>
+      <p:grpSpPr>
+        <a:xfrm>
+          <a:off x="0" y="0"/>
+          <a:ext cx="0" cy="0"/>
+          <a:chOff x="0" y="0"/>
+          <a:chExt cx="0" cy="0"/>
+        </a:xfrm>
+      </p:grpSpPr>
+      <p:sp>
+        <p:nvSpPr>
+          <p:cNvPr id="2" name="Title 1"/>
+          <p:cNvSpPr>
+            <a:spLocks noGrp="1"/>
+          </p:cNvSpPr>
+          <p:nvPr>
+            <p:ph type="title"/>
+          </p:nvPr>
+        </p:nvSpPr>
+        <p:spPr/>
+        <p:txBody>
+          <a:bodyPr/>
+          <a:lstStyle/>
+          <a:p>
+            <a:pPr lvl="0" indent="0" marL="0">
+              <a:buNone/>
+            </a:pPr>
+            <a:r>
+              <a:rPr/>
+              <a:t>How distance between students work?</a:t>
+            </a:r>
+          </a:p>
+        </p:txBody>
+      </p:sp>
+    </p:spTree>
+  </p:cSld>
+</p:sld>
+</file>
+
+<file path=ppt/slides/slide7.xml><?xml version="1.0" encoding="utf-8"?>
+<p:sld xmlns:a="http://schemas.openxmlformats.org/drawingml/2006/main" xmlns:r="http://schemas.openxmlformats.org/officeDocument/2006/relationships" xmlns:p="http://schemas.openxmlformats.org/presentationml/2006/main">
+  <p:cSld>
+    <p:spTree>
+      <p:nvGrpSpPr>
+        <p:cNvPr id="1" name=""/>
+        <p:cNvGrpSpPr/>
+        <p:nvPr/>
+      </p:nvGrpSpPr>
+      <p:grpSpPr>
+        <a:xfrm>
+          <a:off x="0" y="0"/>
+          <a:ext cx="0" cy="0"/>
+          <a:chOff x="0" y="0"/>
+          <a:chExt cx="0" cy="0"/>
+        </a:xfrm>
+      </p:grpSpPr>
+      <p:sp>
+        <p:nvSpPr>
+          <p:cNvPr id="2" name="Title 1"/>
+          <p:cNvSpPr>
+            <a:spLocks noGrp="1"/>
+          </p:cNvSpPr>
+          <p:nvPr>
+            <p:ph type="title"/>
+          </p:nvPr>
+        </p:nvSpPr>
+        <p:spPr/>
+        <p:txBody>
+          <a:bodyPr/>
+          <a:lstStyle/>
+          <a:p>
+            <a:pPr lvl="0" indent="0" marL="0">
+              <a:buNone/>
+            </a:pPr>
+            <a:r>
+              <a:rPr/>
+              <a:t>Clustering: Linkage Choice</a:t>
+            </a:r>
+          </a:p>
+        </p:txBody>
+      </p:sp>
+    </p:spTree>
+  </p:cSld>
+</p:sld>
+</file>
+
+<file path=ppt/slides/slide8.xml><?xml version="1.0" encoding="utf-8"?>
+<p:sld xmlns:a="http://schemas.openxmlformats.org/drawingml/2006/main" xmlns:r="http://schemas.openxmlformats.org/officeDocument/2006/relationships" xmlns:p="http://schemas.openxmlformats.org/presentationml/2006/main">
+  <p:cSld>
+    <p:spTree>
+      <p:nvGrpSpPr>
+        <p:cNvPr id="1" name=""/>
+        <p:cNvGrpSpPr/>
+        <p:nvPr/>
+      </p:nvGrpSpPr>
+      <p:grpSpPr>
+        <a:xfrm>
+          <a:off x="0" y="0"/>
+          <a:ext cx="0" cy="0"/>
+          <a:chOff x="0" y="0"/>
+          <a:chExt cx="0" cy="0"/>
+        </a:xfrm>
+      </p:grpSpPr>
+      <p:sp>
+        <p:nvSpPr>
+          <p:cNvPr id="2" name="Title 1"/>
+          <p:cNvSpPr>
+            <a:spLocks noGrp="1"/>
+          </p:cNvSpPr>
+          <p:nvPr>
+            <p:ph type="title"/>
+          </p:nvPr>
+        </p:nvSpPr>
+        <p:spPr/>
+        <p:txBody>
+          <a:bodyPr/>
+          <a:lstStyle/>
+          <a:p>
+            <a:pPr lvl="0" indent="0" marL="0">
+              <a:buNone/>
+            </a:pPr>
+            <a:r>
+              <a:rPr/>
+              <a:t>Clustering: Code and Dendrogram</a:t>
+            </a:r>
+          </a:p>
+        </p:txBody>
+      </p:sp>
+    </p:spTree>
+  </p:cSld>
+</p:sld>
+</file>
+
+<file path=ppt/slides/slide9.xml><?xml version="1.0" encoding="utf-8"?>
+<p:sld xmlns:a="http://schemas.openxmlformats.org/drawingml/2006/main" xmlns:r="http://schemas.openxmlformats.org/officeDocument/2006/relationships" xmlns:p="http://schemas.openxmlformats.org/presentationml/2006/main">
+  <p:cSld>
+    <p:spTree>
+      <p:nvGrpSpPr>
+        <p:cNvPr id="1" name=""/>
+        <p:cNvGrpSpPr/>
+        <p:nvPr/>
+      </p:nvGrpSpPr>
+      <p:grpSpPr>
+        <a:xfrm>
+          <a:off x="0" y="0"/>
+          <a:ext cx="0" cy="0"/>
+          <a:chOff x="0" y="0"/>
+          <a:chExt cx="0" cy="0"/>
+        </a:xfrm>
+      </p:grpSpPr>
+      <p:sp>
+        <p:nvSpPr>
+          <p:cNvPr id="2" name="Title 1"/>
+          <p:cNvSpPr>
+            <a:spLocks noGrp="1"/>
+          </p:cNvSpPr>
+          <p:nvPr>
+            <p:ph type="title"/>
+          </p:nvPr>
+        </p:nvSpPr>
+        <p:spPr/>
+        <p:txBody>
+          <a:bodyPr/>
+          <a:lstStyle/>
+          <a:p>
+            <a:pPr lvl="0" indent="0" marL="0">
+              <a:buNone/>
+            </a:pPr>
+            <a:r>
+              <a:rPr/>
+              <a:t>Group Recommendations and Student Assignment</a:t>
             </a:r>
           </a:p>
         </p:txBody>

</xml_diff>

<commit_message>
created qr code logic using qrcode library
</commit_message>
<xml_diff>
--- a/presentation.pptx
+++ b/presentation.pptx
@@ -3194,7 +3194,12 @@
             <p:ph type="title"/>
           </p:nvPr>
         </p:nvSpPr>
-        <p:spPr/>
+        <p:spPr>
+          <a:xfrm>
+            <a:off x="457201" y="204787"/>
+            <a:ext cx="3008313" cy="871538"/>
+          </a:xfrm>
+        </p:spPr>
         <p:txBody>
           <a:bodyPr/>
           <a:lstStyle/>
@@ -3211,12 +3216,12 @@
       </p:sp>
       <p:sp>
         <p:nvSpPr>
-          <p:cNvPr id="3" name="Content Placeholder 2"/>
-          <p:cNvSpPr>
-            <a:spLocks noGrp="1"/>
-          </p:cNvSpPr>
-          <p:nvPr>
-            <p:ph idx="1"/>
+          <p:cNvPr id="4" name="Text Placeholder 3"/>
+          <p:cNvSpPr>
+            <a:spLocks noGrp="1"/>
+          </p:cNvSpPr>
+          <p:nvPr>
+            <p:ph idx="2" sz="half" type="body"/>
           </p:nvPr>
         </p:nvSpPr>
         <p:spPr/>
@@ -3227,11 +3232,47 @@
             <a:pPr lvl="0"/>
             <a:r>
               <a:rPr/>
-              <a:t>Url: https://forms.gle/mBq7GdZiLTy8Ydhf9</a:t>
-            </a:r>
-          </a:p>
-        </p:txBody>
-      </p:sp>
+              <a:t>Link: </a:t>
+            </a:r>
+            <a:r>
+              <a:rPr>
+                <a:hlinkClick r:id="rId2"/>
+              </a:rPr>
+              <a:t>https://forms.gle/mBq7GdZiLTy8Ydhf9</a:t>
+            </a:r>
+          </a:p>
+        </p:txBody>
+      </p:sp>
+      <p:pic>
+        <p:nvPicPr>
+          <p:cNvPr descr="presentation_files/figure-pptx/cell-3-output-1.png" id="0" name="Picture 1"/>
+          <p:cNvPicPr>
+            <a:picLocks noGrp="1" noChangeAspect="1"/>
+          </p:cNvPicPr>
+          <p:nvPr/>
+        </p:nvPicPr>
+        <p:blipFill>
+          <a:blip r:embed="rId3"/>
+          <a:stretch>
+            <a:fillRect/>
+          </a:stretch>
+        </p:blipFill>
+        <p:spPr bwMode="auto">
+          <a:xfrm>
+            <a:off x="3937000" y="203200"/>
+            <a:ext cx="4381500" cy="4381500"/>
+          </a:xfrm>
+          <a:prstGeom prst="rect">
+            <a:avLst/>
+          </a:prstGeom>
+          <a:noFill/>
+          <a:ln w="9525">
+            <a:noFill/>
+            <a:headEnd/>
+            <a:tailEnd/>
+          </a:ln>
+        </p:spPr>
+      </p:pic>
     </p:spTree>
   </p:cSld>
 </p:sld>

</xml_diff>

<commit_message>
Gowers method slide added with image
</commit_message>
<xml_diff>
--- a/presentation.pptx
+++ b/presentation.pptx
@@ -16,6 +16,7 @@
     <p:sldId id="264" r:id="rId10"/>
     <p:sldId id="265" r:id="rId11"/>
     <p:sldId id="266" r:id="rId12"/>
+    <p:sldId id="267" r:id="rId13"/>
   </p:sldIdLst>
   <p:sldSz cx="9144000" cy="5143500" type="screen16x9"/>
   <p:notesSz cx="6858000" cy="9144000"/>
@@ -3194,12 +3195,7 @@
             <p:ph type="title"/>
           </p:nvPr>
         </p:nvSpPr>
-        <p:spPr>
-          <a:xfrm>
-            <a:off x="457201" y="204787"/>
-            <a:ext cx="3008313" cy="871538"/>
-          </a:xfrm>
-        </p:spPr>
+        <p:spPr/>
         <p:txBody>
           <a:bodyPr/>
           <a:lstStyle/>
@@ -3209,76 +3205,30 @@
             </a:pPr>
             <a:r>
               <a:rPr/>
-              <a:t>Evaluation Form (from Presenting Team)</a:t>
-            </a:r>
-          </a:p>
-        </p:txBody>
-      </p:sp>
-      <p:sp>
-        <p:nvSpPr>
-          <p:cNvPr id="4" name="Text Placeholder 3"/>
-          <p:cNvSpPr>
-            <a:spLocks noGrp="1"/>
-          </p:cNvSpPr>
-          <p:nvPr>
-            <p:ph idx="2" sz="half" type="body"/>
-          </p:nvPr>
-        </p:nvSpPr>
-        <p:spPr/>
-        <p:txBody>
-          <a:bodyPr/>
-          <a:lstStyle/>
-          <a:p>
-            <a:pPr lvl="0"/>
-            <a:r>
-              <a:rPr/>
-              <a:t>Link: </a:t>
-            </a:r>
-            <a:r>
-              <a:rPr>
-                <a:hlinkClick r:id="rId2"/>
-              </a:rPr>
-              <a:t>https://forms.gle/mBq7GdZiLTy8Ydhf9</a:t>
-            </a:r>
-          </a:p>
-        </p:txBody>
-      </p:sp>
-      <p:pic>
-        <p:nvPicPr>
-          <p:cNvPr descr="presentation_files/figure-pptx/cell-4-output-1.png" id="0" name="Picture 1"/>
-          <p:cNvPicPr>
-            <a:picLocks noGrp="1" noChangeAspect="1"/>
-          </p:cNvPicPr>
-          <p:nvPr/>
-        </p:nvPicPr>
-        <p:blipFill>
-          <a:blip r:embed="rId3"/>
-          <a:stretch>
-            <a:fillRect/>
-          </a:stretch>
-        </p:blipFill>
-        <p:spPr bwMode="auto">
-          <a:xfrm>
-            <a:off x="3937000" y="203200"/>
-            <a:ext cx="4381500" cy="4381500"/>
-          </a:xfrm>
-          <a:prstGeom prst="rect">
-            <a:avLst/>
-          </a:prstGeom>
-          <a:noFill/>
-          <a:ln w="9525">
-            <a:noFill/>
-            <a:headEnd/>
-            <a:tailEnd/>
-          </a:ln>
-        </p:spPr>
-      </p:pic>
+              <a:t>Group Recommendations and Student Assignment</a:t>
+            </a:r>
+          </a:p>
+        </p:txBody>
+      </p:sp>
     </p:spTree>
   </p:cSld>
 </p:sld>
 </file>
 
-<file path=ppt/slides/slide11.xml><?xml version="1.0" encoding="utf-8"?>
+<file path=ppt/slides/slide11.xml><?xml version="1.0" encoding="UTF-8"?><p:sld xmlns:a="http://schemas.openxmlformats.org/drawingml/2006/main" xmlns:r="http://schemas.openxmlformats.org/officeDocument/2006/relationships" xmlns:p="http://schemas.openxmlformats.org/presentationml/2006/main"><p:cSld><p:spTree><p:nvGrpSpPr><p:cNvPr id="1" name="" /><p:cNvGrpSpPr /><p:nvPr /></p:nvGrpSpPr><p:grpSpPr><a:xfrm><a:off x="0" y="0" /><a:ext cx="0" cy="0" /><a:chOff x="0" y="0" /><a:chExt cx="0" cy="0" /></a:xfrm></p:grpSpPr><p:sp><p:nvSpPr><p:cNvPr id="2" name="Title 1" /><p:cNvSpPr><a:spLocks noGrp="1" /></p:cNvSpPr><p:nvPr><p:ph type="title" /></p:nvPr></p:nvSpPr><p:spPr /><p:txBody><a:bodyPr /><a:lstStyle /><a:p><a:pPr lvl="0" indent="0" marL="0"><a:buNone /></a:pPr><a:r><a:rPr /><a:t>Evaluation Form (from Presenting Team)</a:t></a:r></a:p></p:txBody></p:sp><p:sp><p:nvSpPr><p:cNvPr id="3" name="Content Placeholder 2" /><p:cNvSpPr><a:spLocks noGrp="1" /></p:cNvSpPr><p:nvPr><p:ph idx="1" /></p:nvPr></p:nvSpPr><p:spPr /><p:txBody><a:bodyPr /><a:lstStyle /><a:p><a:pPr lvl="0" /><a:r><a:rPr /><a:t>Link: </a:t></a:r><a:r><a:rPr><a:hlinkClick r:id="rId2" /></a:rPr><a:t>https://forms.gle/mBq7GdZiLTy8Ydhf9</a:t></a:r></a:p><a:p><a:pPr lvl="0" indent="0"><a:buNone /></a:pPr><a:r><a:rPr><a:latin typeface="Courier" /></a:rPr><a:t>NameError: name &#39;qrcode&#39; is not defined
+[31m---------------------------------------------------------------------------[39m
+[31mNameError[39m                                 Traceback (most recent call last)
+[36mCell[39m[36m [39m[32mIn[3][39m[32m, line 4[39m
+[32m      1[39m url=[33m&quot;[39m[33mhttps://forms.gle/mBq7GdZiLTy8Ydhf9[39m[33m&quot;[39m
+[32m      2[39m [38;5;66;03m# Create QR code[39;00m
+[32m----&gt; [39m[32m4[39m qr=[43mqrcode[49m.QRCode(version=[38;5;28;01mNone[39;00m, box_size=[32m10[39m, border=[32m4[39m)
+[32m      5[39m qr.add_data(url)
+[32m      6[39m qr.make(fit=[38;5;28;01mTrue[39;00m)
+
+[31mNameError[39m: name &#39;qrcode&#39; is not defined</a:t></a:r></a:p></p:txBody></p:sp></p:spTree></p:cSld></p:sld>
+</file>
+
+<file path=ppt/slides/slide12.xml><?xml version="1.0" encoding="utf-8"?>
 <p:sld xmlns:a="http://schemas.openxmlformats.org/drawingml/2006/main" xmlns:r="http://schemas.openxmlformats.org/officeDocument/2006/relationships" xmlns:p="http://schemas.openxmlformats.org/presentationml/2006/main">
   <p:cSld>
     <p:spTree>
@@ -3390,76 +3340,14 @@
 </p:sld>
 </file>
 
-<file path=ppt/slides/slide2.xml><?xml version="1.0" encoding="utf-8"?>
-<p:sld xmlns:a="http://schemas.openxmlformats.org/drawingml/2006/main" xmlns:r="http://schemas.openxmlformats.org/officeDocument/2006/relationships" xmlns:p="http://schemas.openxmlformats.org/presentationml/2006/main">
-  <p:cSld>
-    <p:spTree>
-      <p:nvGrpSpPr>
-        <p:cNvPr id="1" name=""/>
-        <p:cNvGrpSpPr/>
-        <p:nvPr/>
-      </p:nvGrpSpPr>
-      <p:grpSpPr>
-        <a:xfrm>
-          <a:off x="0" y="0"/>
-          <a:ext cx="0" cy="0"/>
-          <a:chOff x="0" y="0"/>
-          <a:chExt cx="0" cy="0"/>
-        </a:xfrm>
-      </p:grpSpPr>
-      <p:sp>
-        <p:nvSpPr>
-          <p:cNvPr id="2" name="Title 1"/>
-          <p:cNvSpPr>
-            <a:spLocks noGrp="1"/>
-          </p:cNvSpPr>
-          <p:nvPr>
-            <p:ph type="title"/>
-          </p:nvPr>
-        </p:nvSpPr>
-        <p:spPr/>
-        <p:txBody>
-          <a:bodyPr/>
-          <a:lstStyle/>
-          <a:p>
-            <a:pPr lvl="0" indent="0" marL="0">
-              <a:buNone/>
-            </a:pPr>
-            <a:r>
-              <a:rPr/>
-              <a:t>Problem Overview</a:t>
-            </a:r>
-          </a:p>
-        </p:txBody>
-      </p:sp>
-      <p:sp>
-        <p:nvSpPr>
-          <p:cNvPr id="3" name="Content Placeholder 2"/>
-          <p:cNvSpPr>
-            <a:spLocks noGrp="1"/>
-          </p:cNvSpPr>
-          <p:nvPr>
-            <p:ph idx="1"/>
-          </p:nvPr>
-        </p:nvSpPr>
-        <p:spPr/>
-        <p:txBody>
-          <a:bodyPr/>
-          <a:lstStyle/>
-          <a:p>
-            <a:pPr lvl="0" indent="0" marL="0">
-              <a:buNone/>
-            </a:pPr>
-            <a:r>
-              <a:rPr/>
-              <a:t>Many students struggle with understanding course material, staying accountable, and performing well on exams. While study groups can feel intimidating, research shows they significantly improve comprehension, retention, and exam scores. Now the big question is: How do we create effective study groups that maximize learning, accountability, and confidence while minimizing the fear of participation?</a:t>
-            </a:r>
-          </a:p>
-        </p:txBody>
-      </p:sp>
-    </p:spTree>
-  </p:cSld>
-</p:sld>
+<file path=ppt/slides/slide2.xml><?xml version="1.0" encoding="UTF-8"?><p:sld xmlns:a="http://schemas.openxmlformats.org/drawingml/2006/main" xmlns:r="http://schemas.openxmlformats.org/officeDocument/2006/relationships" xmlns:p="http://schemas.openxmlformats.org/presentationml/2006/main"><p:cSld><p:spTree><p:nvGrpSpPr><p:cNvPr id="1" name="" /><p:cNvGrpSpPr /><p:nvPr /></p:nvGrpSpPr><p:grpSpPr><a:xfrm><a:off x="0" y="0" /><a:ext cx="0" cy="0" /><a:chOff x="0" y="0" /><a:chExt cx="0" cy="0" /></a:xfrm></p:grpSpPr><p:sp><p:nvSpPr><p:cNvPr id="3" name="Content Placeholder 2" /><p:cNvSpPr><a:spLocks noGrp="1" /></p:cNvSpPr><p:nvPr><p:ph idx="1" /></p:nvPr></p:nvSpPr><p:spPr /><p:txBody><a:bodyPr /><a:lstStyle /><a:p><a:pPr lvl="0" indent="0"><a:buNone /></a:pPr><a:r><a:rPr><a:latin typeface="Courier" /></a:rPr><a:t>ModuleNotFoundError: No module named &#39;qrcode&#39;
+[31m---------------------------------------------------------------------------[39m
+[31mModuleNotFoundError[39m                       Traceback (most recent call last)
+[36mCell[39m[36m [39m[32mIn[1][39m[32m, line 1[39m
+[32m----&gt; [39m[32m1[39m [38;5;28;01mimport[39;00m[38;5;250m [39m[34;01mqrcode[39;00m
+[32m      2[39m [38;5;28;01mimport[39;00m[38;5;250m [39m[34;01mmatplotlib[39;00m[34;01m.[39;00m[34;01mpyplot[39;00m[38;5;250m [39m[38;5;28;01mas[39;00m[38;5;250m [39m[34;01mplt[39;00m
+
+[31mModuleNotFoundError[39m: No module named &#39;qrcode&#39;</a:t></a:r></a:p></p:txBody></p:sp></p:spTree></p:cSld></p:sld>
 </file>
 
 <file path=ppt/slides/slide3.xml><?xml version="1.0" encoding="utf-8"?>
@@ -3489,12 +3377,7 @@
             <p:ph type="title"/>
           </p:nvPr>
         </p:nvSpPr>
-        <p:spPr>
-          <a:xfrm>
-            <a:off x="457201" y="204787"/>
-            <a:ext cx="3008313" cy="871538"/>
-          </a:xfrm>
-        </p:spPr>
+        <p:spPr/>
         <p:txBody>
           <a:bodyPr/>
           <a:lstStyle/>
@@ -3504,19 +3387,19 @@
             </a:pPr>
             <a:r>
               <a:rPr/>
-              <a:t>Data Collection - Fill Out This Form!</a:t>
-            </a:r>
-          </a:p>
-        </p:txBody>
-      </p:sp>
-      <p:sp>
-        <p:nvSpPr>
-          <p:cNvPr id="4" name="Text Placeholder 3"/>
-          <p:cNvSpPr>
-            <a:spLocks noGrp="1"/>
-          </p:cNvSpPr>
-          <p:nvPr>
-            <p:ph idx="2" sz="half" type="body"/>
+              <a:t>Problem Overview</a:t>
+            </a:r>
+          </a:p>
+        </p:txBody>
+      </p:sp>
+      <p:sp>
+        <p:nvSpPr>
+          <p:cNvPr id="3" name="Content Placeholder 2"/>
+          <p:cNvSpPr>
+            <a:spLocks noGrp="1"/>
+          </p:cNvSpPr>
+          <p:nvPr>
+            <p:ph idx="1"/>
           </p:nvPr>
         </p:nvSpPr>
         <p:spPr/>
@@ -3529,91 +3412,27 @@
             </a:pPr>
             <a:r>
               <a:rPr/>
-              <a:t>First, please fill out our short survey, which we’ll use to recommend everyone’s study groups! While you are all filling that out, we’ll begin talking about the methods used in our hierarchical clustering algorithm. You are all your own cluster to start, but will begin merging together one by one based on similarity and differences in responses!</a:t>
-            </a:r>
-          </a:p>
-        </p:txBody>
-      </p:sp>
-      <p:pic>
-        <p:nvPicPr>
-          <p:cNvPr descr="presentation_files/figure-pptx/cell-3-output-1.png" id="0" name="Picture 1"/>
-          <p:cNvPicPr>
-            <a:picLocks noGrp="1" noChangeAspect="1"/>
-          </p:cNvPicPr>
-          <p:nvPr/>
-        </p:nvPicPr>
-        <p:blipFill>
-          <a:blip r:embed="rId2"/>
-          <a:stretch>
-            <a:fillRect/>
-          </a:stretch>
-        </p:blipFill>
-        <p:spPr bwMode="auto">
-          <a:xfrm>
-            <a:off x="3937000" y="203200"/>
-            <a:ext cx="4381500" cy="4381500"/>
-          </a:xfrm>
-          <a:prstGeom prst="rect">
-            <a:avLst/>
-          </a:prstGeom>
-          <a:noFill/>
-          <a:ln w="9525">
-            <a:noFill/>
-            <a:headEnd/>
-            <a:tailEnd/>
-          </a:ln>
-        </p:spPr>
-      </p:pic>
+              <a:t>Many students struggle with understanding course material, staying accountable, and performing well on exams. While study groups can feel intimidating, research shows they significantly improve comprehension, retention, and exam scores. Now the big question is: How do we create effective study groups that maximize learning, accountability, and confidence while minimizing the fear of participation?</a:t>
+            </a:r>
+          </a:p>
+        </p:txBody>
+      </p:sp>
     </p:spTree>
   </p:cSld>
 </p:sld>
 </file>
 
-<file path=ppt/slides/slide4.xml><?xml version="1.0" encoding="utf-8"?>
-<p:sld xmlns:a="http://schemas.openxmlformats.org/drawingml/2006/main" xmlns:r="http://schemas.openxmlformats.org/officeDocument/2006/relationships" xmlns:p="http://schemas.openxmlformats.org/presentationml/2006/main">
-  <p:cSld>
-    <p:spTree>
-      <p:nvGrpSpPr>
-        <p:cNvPr id="1" name=""/>
-        <p:cNvGrpSpPr/>
-        <p:nvPr/>
-      </p:nvGrpSpPr>
-      <p:grpSpPr>
-        <a:xfrm>
-          <a:off x="0" y="0"/>
-          <a:ext cx="0" cy="0"/>
-          <a:chOff x="0" y="0"/>
-          <a:chExt cx="0" cy="0"/>
-        </a:xfrm>
-      </p:grpSpPr>
-      <p:sp>
-        <p:nvSpPr>
-          <p:cNvPr id="2" name="Title 1"/>
-          <p:cNvSpPr>
-            <a:spLocks noGrp="1"/>
-          </p:cNvSpPr>
-          <p:nvPr>
-            <p:ph type="title"/>
-          </p:nvPr>
-        </p:nvSpPr>
-        <p:spPr/>
-        <p:txBody>
-          <a:bodyPr/>
-          <a:lstStyle/>
-          <a:p>
-            <a:pPr lvl="0" indent="0" marL="0">
-              <a:buNone/>
-            </a:pPr>
-            <a:r>
-              <a:rPr/>
-              <a:t>Tidy Data Collected</a:t>
-            </a:r>
-          </a:p>
-        </p:txBody>
-      </p:sp>
-    </p:spTree>
-  </p:cSld>
-</p:sld>
+<file path=ppt/slides/slide4.xml><?xml version="1.0" encoding="UTF-8"?><p:sld xmlns:a="http://schemas.openxmlformats.org/drawingml/2006/main" xmlns:r="http://schemas.openxmlformats.org/officeDocument/2006/relationships" xmlns:p="http://schemas.openxmlformats.org/presentationml/2006/main"><p:cSld><p:spTree><p:nvGrpSpPr><p:cNvPr id="1" name="" /><p:cNvGrpSpPr /><p:nvPr /></p:nvGrpSpPr><p:grpSpPr><a:xfrm><a:off x="0" y="0" /><a:ext cx="0" cy="0" /><a:chOff x="0" y="0" /><a:chExt cx="0" cy="0" /></a:xfrm></p:grpSpPr><p:sp><p:nvSpPr><p:cNvPr id="2" name="Title 1" /><p:cNvSpPr><a:spLocks noGrp="1" /></p:cNvSpPr><p:nvPr><p:ph type="title" /></p:nvPr></p:nvSpPr><p:spPr /><p:txBody><a:bodyPr /><a:lstStyle /><a:p><a:pPr lvl="0" indent="0" marL="0"><a:buNone /></a:pPr><a:r><a:rPr /><a:t>Data Collection - Fill Out This Form!</a:t></a:r></a:p></p:txBody></p:sp><p:sp><p:nvSpPr><p:cNvPr id="3" name="Content Placeholder 2" /><p:cNvSpPr><a:spLocks noGrp="1" /></p:cNvSpPr><p:nvPr><p:ph idx="1" /></p:nvPr></p:nvSpPr><p:spPr /><p:txBody><a:bodyPr /><a:lstStyle /><a:p><a:pPr lvl="0" indent="0" marL="0"><a:buNone /></a:pPr><a:r><a:rPr /><a:t>First, please fill out our short survey, which we’ll use to recommend everyone’s study groups! While you are all filling that out, we’ll begin talking about the methods used in our hierarchical clustering algorithm. You are all your own cluster to start, but will begin merging together one by one based on similarity and differences in responses!</a:t></a:r></a:p><a:p><a:pPr lvl="0" indent="0"><a:buNone /></a:pPr><a:r><a:rPr><a:latin typeface="Courier" /></a:rPr><a:t>NameError: name &#39;qrcode&#39; is not defined
+[31m---------------------------------------------------------------------------[39m
+[31mNameError[39m                                 Traceback (most recent call last)
+[36mCell[39m[36m [39m[32mIn[2][39m[32m, line 4[39m
+[32m      1[39m url=[33m&quot;[39m[33mhttps://docs.google.com/forms/d/e/1FAIpQLSdO8crqtnLQZqj-13miPjY7mofl3iHILaMsBXpKWxbkXv0R2w/viewform[39m[33m&quot;[39m
+[32m      2[39m [38;5;66;03m# Create QR code[39;00m
+[32m----&gt; [39m[32m4[39m qr=[43mqrcode[49m.QRCode(version=[38;5;28;01mNone[39;00m, box_size=[32m8[39m, border=[32m4[39m)
+[32m      5[39m qr.add_data(url)
+[32m      6[39m qr.make(fit=[38;5;28;01mTrue[39;00m)
+
+[31mNameError[39m: name &#39;qrcode&#39; is not defined</a:t></a:r></a:p></p:txBody></p:sp></p:spTree></p:cSld></p:sld>
 </file>
 
 <file path=ppt/slides/slide5.xml><?xml version="1.0" encoding="utf-8"?>
@@ -3653,7 +3472,7 @@
             </a:pPr>
             <a:r>
               <a:rPr/>
-              <a:t>Distance Definition</a:t>
+              <a:t>Tidy Data Collected</a:t>
             </a:r>
           </a:p>
         </p:txBody>
@@ -3700,7 +3519,67 @@
             </a:pPr>
             <a:r>
               <a:rPr/>
-              <a:t>How distance between students work?</a:t>
+              <a:t>Gower’s Method for Distances Between Clusters</a:t>
+            </a:r>
+          </a:p>
+        </p:txBody>
+      </p:sp>
+      <p:pic>
+        <p:nvPicPr>
+          <p:cNvPr descr="gowers_method.png" id="0" name="Picture 1"/>
+          <p:cNvPicPr>
+            <a:picLocks noGrp="1" noChangeAspect="1"/>
+          </p:cNvPicPr>
+          <p:nvPr/>
+        </p:nvPicPr>
+        <p:blipFill>
+          <a:blip r:embed="rId2"/>
+          <a:stretch>
+            <a:fillRect/>
+          </a:stretch>
+        </p:blipFill>
+        <p:spPr bwMode="auto">
+          <a:xfrm>
+            <a:off x="2425700" y="1193800"/>
+            <a:ext cx="4305300" cy="2882900"/>
+          </a:xfrm>
+          <a:prstGeom prst="rect">
+            <a:avLst/>
+          </a:prstGeom>
+          <a:noFill/>
+          <a:ln w="9525">
+            <a:noFill/>
+            <a:headEnd/>
+            <a:tailEnd/>
+          </a:ln>
+        </p:spPr>
+      </p:pic>
+      <p:sp>
+        <p:nvSpPr>
+          <p:cNvPr id="1" name="TextBox 3"/>
+          <p:cNvSpPr txBox="1"/>
+          <p:nvPr/>
+        </p:nvSpPr>
+        <p:spPr>
+          <a:xfrm>
+            <a:off x="457200" y="4076700"/>
+            <a:ext cx="8229600" cy="508000"/>
+          </a:xfrm>
+          <a:prstGeom prst="rect">
+            <a:avLst/>
+          </a:prstGeom>
+          <a:noFill/>
+        </p:spPr>
+        <p:txBody>
+          <a:bodyPr/>
+          <a:lstStyle/>
+          <a:p>
+            <a:pPr lvl="0" indent="0" marL="0" algn="ctr">
+              <a:buNone/>
+            </a:pPr>
+            <a:r>
+              <a:rPr/>
+              <a:t>Gower’s Method</a:t>
             </a:r>
           </a:p>
         </p:txBody>
@@ -3747,7 +3626,7 @@
             </a:pPr>
             <a:r>
               <a:rPr/>
-              <a:t>Clustering: Linkage Choice</a:t>
+              <a:t>How distance between students work?</a:t>
             </a:r>
           </a:p>
         </p:txBody>
@@ -3794,7 +3673,7 @@
             </a:pPr>
             <a:r>
               <a:rPr/>
-              <a:t>Clustering: Code and Dendrogram</a:t>
+              <a:t>Clustering: Linkage Choice</a:t>
             </a:r>
           </a:p>
         </p:txBody>
@@ -3841,7 +3720,7 @@
             </a:pPr>
             <a:r>
               <a:rPr/>
-              <a:t>Group Recommendations and Student Assignment</a:t>
+              <a:t>Clustering: Code and Dendrogram</a:t>
             </a:r>
           </a:p>
         </p:txBody>

</xml_diff>

<commit_message>
Added Complete Linkage and Feedback Slides
</commit_message>
<xml_diff>
--- a/presentation.pptx
+++ b/presentation.pptx
@@ -17,6 +17,8 @@
     <p:sldId id="265" r:id="rId11"/>
     <p:sldId id="266" r:id="rId12"/>
     <p:sldId id="267" r:id="rId13"/>
+    <p:sldId id="268" r:id="rId14"/>
+    <p:sldId id="269" r:id="rId15"/>
   </p:sldIdLst>
   <p:sldSz cx="9144000" cy="5143500" type="screen16x9"/>
   <p:notesSz cx="6858000" cy="9144000"/>
@@ -3205,7 +3207,7 @@
             </a:pPr>
             <a:r>
               <a:rPr/>
-              <a:t>Group Recommendations and Student Assignment</a:t>
+              <a:t>Our Results Visualized as a Dendrogram</a:t>
             </a:r>
           </a:p>
         </p:txBody>
@@ -3215,20 +3217,7 @@
 </p:sld>
 </file>
 
-<file path=ppt/slides/slide11.xml><?xml version="1.0" encoding="UTF-8"?><p:sld xmlns:a="http://schemas.openxmlformats.org/drawingml/2006/main" xmlns:r="http://schemas.openxmlformats.org/officeDocument/2006/relationships" xmlns:p="http://schemas.openxmlformats.org/presentationml/2006/main"><p:cSld><p:spTree><p:nvGrpSpPr><p:cNvPr id="1" name="" /><p:cNvGrpSpPr /><p:nvPr /></p:nvGrpSpPr><p:grpSpPr><a:xfrm><a:off x="0" y="0" /><a:ext cx="0" cy="0" /><a:chOff x="0" y="0" /><a:chExt cx="0" cy="0" /></a:xfrm></p:grpSpPr><p:sp><p:nvSpPr><p:cNvPr id="2" name="Title 1" /><p:cNvSpPr><a:spLocks noGrp="1" /></p:cNvSpPr><p:nvPr><p:ph type="title" /></p:nvPr></p:nvSpPr><p:spPr /><p:txBody><a:bodyPr /><a:lstStyle /><a:p><a:pPr lvl="0" indent="0" marL="0"><a:buNone /></a:pPr><a:r><a:rPr /><a:t>Evaluation Form (from Presenting Team)</a:t></a:r></a:p></p:txBody></p:sp><p:sp><p:nvSpPr><p:cNvPr id="3" name="Content Placeholder 2" /><p:cNvSpPr><a:spLocks noGrp="1" /></p:cNvSpPr><p:nvPr><p:ph idx="1" /></p:nvPr></p:nvSpPr><p:spPr /><p:txBody><a:bodyPr /><a:lstStyle /><a:p><a:pPr lvl="0" /><a:r><a:rPr /><a:t>Link: </a:t></a:r><a:r><a:rPr><a:hlinkClick r:id="rId2" /></a:rPr><a:t>https://forms.gle/mBq7GdZiLTy8Ydhf9</a:t></a:r></a:p><a:p><a:pPr lvl="0" indent="0"><a:buNone /></a:pPr><a:r><a:rPr><a:latin typeface="Courier" /></a:rPr><a:t>NameError: name &#39;qrcode&#39; is not defined
-[31m---------------------------------------------------------------------------[39m
-[31mNameError[39m                                 Traceback (most recent call last)
-[36mCell[39m[36m [39m[32mIn[3][39m[32m, line 4[39m
-[32m      1[39m url=[33m&quot;[39m[33mhttps://forms.gle/mBq7GdZiLTy8Ydhf9[39m[33m&quot;[39m
-[32m      2[39m [38;5;66;03m# Create QR code[39;00m
-[32m----&gt; [39m[32m4[39m qr=[43mqrcode[49m.QRCode(version=[38;5;28;01mNone[39;00m, box_size=[32m10[39m, border=[32m4[39m)
-[32m      5[39m qr.add_data(url)
-[32m      6[39m qr.make(fit=[38;5;28;01mTrue[39;00m)
-
-[31mNameError[39m: name &#39;qrcode&#39; is not defined</a:t></a:r></a:p></p:txBody></p:sp></p:spTree></p:cSld></p:sld>
-</file>
-
-<file path=ppt/slides/slide12.xml><?xml version="1.0" encoding="utf-8"?>
+<file path=ppt/slides/slide11.xml><?xml version="1.0" encoding="utf-8"?>
 <p:sld xmlns:a="http://schemas.openxmlformats.org/drawingml/2006/main" xmlns:r="http://schemas.openxmlformats.org/officeDocument/2006/relationships" xmlns:p="http://schemas.openxmlformats.org/presentationml/2006/main">
   <p:cSld>
     <p:spTree>
@@ -3265,6 +3254,138 @@
             </a:pPr>
             <a:r>
               <a:rPr/>
+              <a:t>Group Recommendations and Student Assignment</a:t>
+            </a:r>
+          </a:p>
+        </p:txBody>
+      </p:sp>
+    </p:spTree>
+  </p:cSld>
+</p:sld>
+</file>
+
+<file path=ppt/slides/slide12.xml><?xml version="1.0" encoding="UTF-8"?><p:sld xmlns:a="http://schemas.openxmlformats.org/drawingml/2006/main" xmlns:r="http://schemas.openxmlformats.org/officeDocument/2006/relationships" xmlns:p="http://schemas.openxmlformats.org/presentationml/2006/main"><p:cSld><p:spTree><p:nvGrpSpPr><p:cNvPr id="1" name="" /><p:cNvGrpSpPr /><p:nvPr /></p:nvGrpSpPr><p:grpSpPr><a:xfrm><a:off x="0" y="0" /><a:ext cx="0" cy="0" /><a:chOff x="0" y="0" /><a:chExt cx="0" cy="0" /></a:xfrm></p:grpSpPr><p:sp><p:nvSpPr><p:cNvPr id="2" name="Title 1" /><p:cNvSpPr><a:spLocks noGrp="1" /></p:cNvSpPr><p:nvPr><p:ph type="title" /></p:nvPr></p:nvSpPr><p:spPr /><p:txBody><a:bodyPr /><a:lstStyle /><a:p><a:pPr lvl="0" indent="0" marL="0"><a:buNone /></a:pPr><a:r><a:rPr /><a:t>Evaluation Form (from Presenting Team)</a:t></a:r></a:p></p:txBody></p:sp><p:sp><p:nvSpPr><p:cNvPr id="3" name="Content Placeholder 2" /><p:cNvSpPr><a:spLocks noGrp="1" /></p:cNvSpPr><p:nvPr><p:ph idx="1" /></p:nvPr></p:nvSpPr><p:spPr /><p:txBody><a:bodyPr /><a:lstStyle /><a:p><a:pPr lvl="0" /><a:r><a:rPr /><a:t>Link: </a:t></a:r><a:r><a:rPr><a:hlinkClick r:id="rId2" /></a:rPr><a:t>https://forms.gle/mBq7GdZiLTy8Ydhf9</a:t></a:r></a:p><a:p><a:pPr lvl="0" indent="0"><a:buNone /></a:pPr><a:r><a:rPr><a:latin typeface="Courier" /></a:rPr><a:t>NameError: name &#39;qrcode&#39; is not defined
+[31m---------------------------------------------------------------------------[39m
+[31mNameError[39m                                 Traceback (most recent call last)
+[36mCell[39m[36m [39m[32mIn[3][39m[32m, line 4[39m
+[32m      1[39m url=[33m&quot;[39m[33mhttps://forms.gle/mBq7GdZiLTy8Ydhf9[39m[33m&quot;[39m
+[32m      2[39m [38;5;66;03m# Create QR code[39;00m
+[32m----&gt; [39m[32m4[39m qr=[43mqrcode[49m.QRCode(version=[38;5;28;01mNone[39;00m, box_size=[32m10[39m, border=[32m4[39m)
+[32m      5[39m qr.add_data(url)
+[32m      6[39m qr.make(fit=[38;5;28;01mTrue[39;00m)
+
+[31mNameError[39m: name &#39;qrcode&#39; is not defined</a:t></a:r></a:p></p:txBody></p:sp></p:spTree></p:cSld></p:sld>
+</file>
+
+<file path=ppt/slides/slide13.xml><?xml version="1.0" encoding="utf-8"?>
+<p:sld xmlns:a="http://schemas.openxmlformats.org/drawingml/2006/main" xmlns:r="http://schemas.openxmlformats.org/officeDocument/2006/relationships" xmlns:p="http://schemas.openxmlformats.org/presentationml/2006/main">
+  <p:cSld>
+    <p:spTree>
+      <p:nvGrpSpPr>
+        <p:cNvPr id="1" name=""/>
+        <p:cNvGrpSpPr/>
+        <p:nvPr/>
+      </p:nvGrpSpPr>
+      <p:grpSpPr>
+        <a:xfrm>
+          <a:off x="0" y="0"/>
+          <a:ext cx="0" cy="0"/>
+          <a:chOff x="0" y="0"/>
+          <a:chExt cx="0" cy="0"/>
+        </a:xfrm>
+      </p:grpSpPr>
+      <p:sp>
+        <p:nvSpPr>
+          <p:cNvPr id="2" name="Title 1"/>
+          <p:cNvSpPr>
+            <a:spLocks noGrp="1"/>
+          </p:cNvSpPr>
+          <p:nvPr>
+            <p:ph type="title"/>
+          </p:nvPr>
+        </p:nvSpPr>
+        <p:spPr/>
+        <p:txBody>
+          <a:bodyPr/>
+          <a:lstStyle/>
+          <a:p>
+            <a:pPr lvl="0" indent="0" marL="0">
+              <a:buNone/>
+            </a:pPr>
+            <a:r>
+              <a:rPr/>
+              <a:t>Feedback from the Evaluation Form</a:t>
+            </a:r>
+          </a:p>
+        </p:txBody>
+      </p:sp>
+      <p:sp>
+        <p:nvSpPr>
+          <p:cNvPr id="3" name="Content Placeholder 2"/>
+          <p:cNvSpPr>
+            <a:spLocks noGrp="1"/>
+          </p:cNvSpPr>
+          <p:nvPr>
+            <p:ph idx="1"/>
+          </p:nvPr>
+        </p:nvSpPr>
+        <p:spPr/>
+        <p:txBody>
+          <a:bodyPr/>
+          <a:lstStyle/>
+          <a:p>
+            <a:pPr lvl="0" indent="0" marL="0">
+              <a:buNone/>
+            </a:pPr>
+            <a:r>
+              <a:rPr/>
+              <a:t>Feedback from the evaluation form will be anonymous, however the results will help us all improve future iterations of our model generalized to all students. ** Ask Rosanna if she wants to share the results to them later on **</a:t>
+            </a:r>
+          </a:p>
+        </p:txBody>
+      </p:sp>
+    </p:spTree>
+  </p:cSld>
+</p:sld>
+</file>
+
+<file path=ppt/slides/slide14.xml><?xml version="1.0" encoding="utf-8"?>
+<p:sld xmlns:a="http://schemas.openxmlformats.org/drawingml/2006/main" xmlns:r="http://schemas.openxmlformats.org/officeDocument/2006/relationships" xmlns:p="http://schemas.openxmlformats.org/presentationml/2006/main">
+  <p:cSld>
+    <p:spTree>
+      <p:nvGrpSpPr>
+        <p:cNvPr id="1" name=""/>
+        <p:cNvGrpSpPr/>
+        <p:nvPr/>
+      </p:nvGrpSpPr>
+      <p:grpSpPr>
+        <a:xfrm>
+          <a:off x="0" y="0"/>
+          <a:ext cx="0" cy="0"/>
+          <a:chOff x="0" y="0"/>
+          <a:chExt cx="0" cy="0"/>
+        </a:xfrm>
+      </p:grpSpPr>
+      <p:sp>
+        <p:nvSpPr>
+          <p:cNvPr id="2" name="Title 1"/>
+          <p:cNvSpPr>
+            <a:spLocks noGrp="1"/>
+          </p:cNvSpPr>
+          <p:nvPr>
+            <p:ph type="title"/>
+          </p:nvPr>
+        </p:nvSpPr>
+        <p:spPr/>
+        <p:txBody>
+          <a:bodyPr/>
+          <a:lstStyle/>
+          <a:p>
+            <a:pPr lvl="0" indent="0" marL="0">
+              <a:buNone/>
+            </a:pPr>
+            <a:r>
+              <a:rPr/>
               <a:t>Credits</a:t>
             </a:r>
           </a:p>
@@ -3295,28 +3416,28 @@
             <a:pPr lvl="1"/>
             <a:r>
               <a:rPr/>
-              <a:t>Anthony Wolfe - Job Title</a:t>
+              <a:t>Anthony Wolfe - Project Coordinator</a:t>
             </a:r>
           </a:p>
           <a:p>
             <a:pPr lvl="1"/>
             <a:r>
               <a:rPr/>
-              <a:t>Dean Callahan - Job Title</a:t>
+              <a:t>Dean Callahan - Technical Lead</a:t>
             </a:r>
           </a:p>
           <a:p>
             <a:pPr lvl="1"/>
             <a:r>
               <a:rPr/>
-              <a:t>Jonathan Juarez - Job Title</a:t>
+              <a:t>Jonathan Juarez - Data Scientist</a:t>
             </a:r>
           </a:p>
           <a:p>
             <a:pPr lvl="1"/>
             <a:r>
               <a:rPr/>
-              <a:t>Devon Walker - Job Title</a:t>
+              <a:t>Devon Walker - Data Scientist</a:t>
             </a:r>
           </a:p>
           <a:p>
@@ -3472,54 +3593,7 @@
             </a:pPr>
             <a:r>
               <a:rPr/>
-              <a:t>Tidy Data Collected</a:t>
-            </a:r>
-          </a:p>
-        </p:txBody>
-      </p:sp>
-    </p:spTree>
-  </p:cSld>
-</p:sld>
-</file>
-
-<file path=ppt/slides/slide6.xml><?xml version="1.0" encoding="utf-8"?>
-<p:sld xmlns:a="http://schemas.openxmlformats.org/drawingml/2006/main" xmlns:r="http://schemas.openxmlformats.org/officeDocument/2006/relationships" xmlns:p="http://schemas.openxmlformats.org/presentationml/2006/main">
-  <p:cSld>
-    <p:spTree>
-      <p:nvGrpSpPr>
-        <p:cNvPr id="1" name=""/>
-        <p:cNvGrpSpPr/>
-        <p:nvPr/>
-      </p:nvGrpSpPr>
-      <p:grpSpPr>
-        <a:xfrm>
-          <a:off x="0" y="0"/>
-          <a:ext cx="0" cy="0"/>
-          <a:chOff x="0" y="0"/>
-          <a:chExt cx="0" cy="0"/>
-        </a:xfrm>
-      </p:grpSpPr>
-      <p:sp>
-        <p:nvSpPr>
-          <p:cNvPr id="2" name="Title 1"/>
-          <p:cNvSpPr>
-            <a:spLocks noGrp="1"/>
-          </p:cNvSpPr>
-          <p:nvPr>
-            <p:ph type="title"/>
-          </p:nvPr>
-        </p:nvSpPr>
-        <p:spPr/>
-        <p:txBody>
-          <a:bodyPr/>
-          <a:lstStyle/>
-          <a:p>
-            <a:pPr lvl="0" indent="0" marL="0">
-              <a:buNone/>
-            </a:pPr>
-            <a:r>
-              <a:rPr/>
-              <a:t>Gower’s Method for Distances Between Clusters</a:t>
+              <a:t>Gower’s for Distances Between Clusters</a:t>
             </a:r>
           </a:p>
         </p:txBody>
@@ -3589,6 +3663,53 @@
 </p:sld>
 </file>
 
+<file path=ppt/slides/slide6.xml><?xml version="1.0" encoding="utf-8"?>
+<p:sld xmlns:a="http://schemas.openxmlformats.org/drawingml/2006/main" xmlns:r="http://schemas.openxmlformats.org/officeDocument/2006/relationships" xmlns:p="http://schemas.openxmlformats.org/presentationml/2006/main">
+  <p:cSld>
+    <p:spTree>
+      <p:nvGrpSpPr>
+        <p:cNvPr id="1" name=""/>
+        <p:cNvGrpSpPr/>
+        <p:nvPr/>
+      </p:nvGrpSpPr>
+      <p:grpSpPr>
+        <a:xfrm>
+          <a:off x="0" y="0"/>
+          <a:ext cx="0" cy="0"/>
+          <a:chOff x="0" y="0"/>
+          <a:chExt cx="0" cy="0"/>
+        </a:xfrm>
+      </p:grpSpPr>
+      <p:sp>
+        <p:nvSpPr>
+          <p:cNvPr id="2" name="Title 1"/>
+          <p:cNvSpPr>
+            <a:spLocks noGrp="1"/>
+          </p:cNvSpPr>
+          <p:nvPr>
+            <p:ph type="title"/>
+          </p:nvPr>
+        </p:nvSpPr>
+        <p:spPr/>
+        <p:txBody>
+          <a:bodyPr/>
+          <a:lstStyle/>
+          <a:p>
+            <a:pPr lvl="0" indent="0" marL="0">
+              <a:buNone/>
+            </a:pPr>
+            <a:r>
+              <a:rPr/>
+              <a:t>How does our distance work between students?</a:t>
+            </a:r>
+          </a:p>
+        </p:txBody>
+      </p:sp>
+    </p:spTree>
+  </p:cSld>
+</p:sld>
+</file>
+
 <file path=ppt/slides/slide7.xml><?xml version="1.0" encoding="utf-8"?>
 <p:sld xmlns:a="http://schemas.openxmlformats.org/drawingml/2006/main" xmlns:r="http://schemas.openxmlformats.org/officeDocument/2006/relationships" xmlns:p="http://schemas.openxmlformats.org/presentationml/2006/main">
   <p:cSld>
@@ -3626,7 +3747,92 @@
             </a:pPr>
             <a:r>
               <a:rPr/>
-              <a:t>How distance between students work?</a:t>
+              <a:t>Complete Linkage for Merging Clusters</a:t>
+            </a:r>
+          </a:p>
+        </p:txBody>
+      </p:sp>
+      <p:sp>
+        <p:nvSpPr>
+          <p:cNvPr id="3" name="Content Placeholder 2"/>
+          <p:cNvSpPr>
+            <a:spLocks noGrp="1"/>
+          </p:cNvSpPr>
+          <p:nvPr>
+            <p:ph idx="1" sz="half"/>
+          </p:nvPr>
+        </p:nvSpPr>
+        <p:spPr/>
+        <p:txBody>
+          <a:bodyPr/>
+          <a:lstStyle/>
+          <a:p>
+            <a:pPr lvl="0" indent="0" marL="0">
+              <a:buNone/>
+            </a:pPr>
+            <a:r>
+              <a:rPr/>
+              <a:t>Complete linkage describes the metric we use to decide the merging of clusters. In particular, we merge the minimum distance created by the farthest points within two clusters, which is found by comparing the distances from every pair of points between the clusters.</a:t>
+            </a:r>
+          </a:p>
+        </p:txBody>
+      </p:sp>
+      <p:pic>
+        <p:nvPicPr>
+          <p:cNvPr descr="complete_linkage.png" id="0" name="Picture 1"/>
+          <p:cNvPicPr>
+            <a:picLocks noGrp="1" noChangeAspect="1"/>
+          </p:cNvPicPr>
+          <p:nvPr/>
+        </p:nvPicPr>
+        <p:blipFill>
+          <a:blip r:embed="rId2"/>
+          <a:stretch>
+            <a:fillRect/>
+          </a:stretch>
+        </p:blipFill>
+        <p:spPr bwMode="auto">
+          <a:xfrm>
+            <a:off x="4648200" y="1638300"/>
+            <a:ext cx="4038600" cy="1981200"/>
+          </a:xfrm>
+          <a:prstGeom prst="rect">
+            <a:avLst/>
+          </a:prstGeom>
+          <a:noFill/>
+          <a:ln w="9525">
+            <a:noFill/>
+            <a:headEnd/>
+            <a:tailEnd/>
+          </a:ln>
+        </p:spPr>
+      </p:pic>
+      <p:sp>
+        <p:nvSpPr>
+          <p:cNvPr id="1" name="TextBox 3"/>
+          <p:cNvSpPr txBox="1"/>
+          <p:nvPr/>
+        </p:nvSpPr>
+        <p:spPr>
+          <a:xfrm>
+            <a:off x="4648200" y="4076700"/>
+            <a:ext cx="4038600" cy="508000"/>
+          </a:xfrm>
+          <a:prstGeom prst="rect">
+            <a:avLst/>
+          </a:prstGeom>
+          <a:noFill/>
+        </p:spPr>
+        <p:txBody>
+          <a:bodyPr/>
+          <a:lstStyle/>
+          <a:p>
+            <a:pPr lvl="0" indent="0" marL="0" algn="ctr">
+              <a:buNone/>
+            </a:pPr>
+            <a:r>
+              <a:rPr/>
+              <a:t>Visualization of Complete Linkage</a:t>
             </a:r>
           </a:p>
         </p:txBody>
@@ -3673,7 +3879,7 @@
             </a:pPr>
             <a:r>
               <a:rPr/>
-              <a:t>Clustering: Linkage Choice</a:t>
+              <a:t>Tidy Data Collected</a:t>
             </a:r>
           </a:p>
         </p:txBody>
@@ -3720,7 +3926,7 @@
             </a:pPr>
             <a:r>
               <a:rPr/>
-              <a:t>Clustering: Code and Dendrogram</a:t>
+              <a:t>Let’s Look at the Code</a:t>
             </a:r>
           </a:p>
         </p:txBody>

</xml_diff>

<commit_message>
Header Adjustment and Slide
Header updated to js to be able to modify font and correct spacing issues to longer text. Additionally added the slide for "How distance between students work?"
</commit_message>
<xml_diff>
--- a/presentation.pptx
+++ b/presentation.pptx
@@ -17,6 +17,7 @@
     <p:sldId id="265" r:id="rId11"/>
     <p:sldId id="266" r:id="rId12"/>
     <p:sldId id="267" r:id="rId13"/>
+    <p:sldId id="268" r:id="rId14"/>
   </p:sldIdLst>
   <p:sldSz cx="9144000" cy="5143500" type="screen16x9"/>
   <p:notesSz cx="6858000" cy="9144000"/>
@@ -3205,7 +3206,7 @@
             </a:pPr>
             <a:r>
               <a:rPr/>
-              <a:t>Group Recommendations and Student Assignment</a:t>
+              <a:t>Our Results Visualized as a Dendrogram</a:t>
             </a:r>
           </a:p>
         </p:txBody>
@@ -3215,20 +3216,7 @@
 </p:sld>
 </file>
 
-<file path=ppt/slides/slide11.xml><?xml version="1.0" encoding="UTF-8"?><p:sld xmlns:a="http://schemas.openxmlformats.org/drawingml/2006/main" xmlns:r="http://schemas.openxmlformats.org/officeDocument/2006/relationships" xmlns:p="http://schemas.openxmlformats.org/presentationml/2006/main"><p:cSld><p:spTree><p:nvGrpSpPr><p:cNvPr id="1" name="" /><p:cNvGrpSpPr /><p:nvPr /></p:nvGrpSpPr><p:grpSpPr><a:xfrm><a:off x="0" y="0" /><a:ext cx="0" cy="0" /><a:chOff x="0" y="0" /><a:chExt cx="0" cy="0" /></a:xfrm></p:grpSpPr><p:sp><p:nvSpPr><p:cNvPr id="2" name="Title 1" /><p:cNvSpPr><a:spLocks noGrp="1" /></p:cNvSpPr><p:nvPr><p:ph type="title" /></p:nvPr></p:nvSpPr><p:spPr /><p:txBody><a:bodyPr /><a:lstStyle /><a:p><a:pPr lvl="0" indent="0" marL="0"><a:buNone /></a:pPr><a:r><a:rPr /><a:t>Evaluation Form (from Presenting Team)</a:t></a:r></a:p></p:txBody></p:sp><p:sp><p:nvSpPr><p:cNvPr id="3" name="Content Placeholder 2" /><p:cNvSpPr><a:spLocks noGrp="1" /></p:cNvSpPr><p:nvPr><p:ph idx="1" /></p:nvPr></p:nvSpPr><p:spPr /><p:txBody><a:bodyPr /><a:lstStyle /><a:p><a:pPr lvl="0" /><a:r><a:rPr /><a:t>Link: </a:t></a:r><a:r><a:rPr><a:hlinkClick r:id="rId2" /></a:rPr><a:t>https://forms.gle/mBq7GdZiLTy8Ydhf9</a:t></a:r></a:p><a:p><a:pPr lvl="0" indent="0"><a:buNone /></a:pPr><a:r><a:rPr><a:latin typeface="Courier" /></a:rPr><a:t>NameError: name &#39;qrcode&#39; is not defined
-[31m---------------------------------------------------------------------------[39m
-[31mNameError[39m                                 Traceback (most recent call last)
-[36mCell[39m[36m [39m[32mIn[3][39m[32m, line 4[39m
-[32m      1[39m url=[33m&quot;[39m[33mhttps://forms.gle/mBq7GdZiLTy8Ydhf9[39m[33m&quot;[39m
-[32m      2[39m [38;5;66;03m# Create QR code[39;00m
-[32m----&gt; [39m[32m4[39m qr=[43mqrcode[49m.QRCode(version=[38;5;28;01mNone[39;00m, box_size=[32m10[39m, border=[32m4[39m)
-[32m      5[39m qr.add_data(url)
-[32m      6[39m qr.make(fit=[38;5;28;01mTrue[39;00m)
-
-[31mNameError[39m: name &#39;qrcode&#39; is not defined</a:t></a:r></a:p></p:txBody></p:sp></p:spTree></p:cSld></p:sld>
-</file>
-
-<file path=ppt/slides/slide12.xml><?xml version="1.0" encoding="utf-8"?>
+<file path=ppt/slides/slide11.xml><?xml version="1.0" encoding="utf-8"?>
 <p:sld xmlns:a="http://schemas.openxmlformats.org/drawingml/2006/main" xmlns:r="http://schemas.openxmlformats.org/officeDocument/2006/relationships" xmlns:p="http://schemas.openxmlformats.org/presentationml/2006/main">
   <p:cSld>
     <p:spTree>
@@ -3265,6 +3253,66 @@
             </a:pPr>
             <a:r>
               <a:rPr/>
+              <a:t>Group Recommendations and Student Assignment</a:t>
+            </a:r>
+          </a:p>
+        </p:txBody>
+      </p:sp>
+    </p:spTree>
+  </p:cSld>
+</p:sld>
+</file>
+
+<file path=ppt/slides/slide12.xml><?xml version="1.0" encoding="UTF-8"?><p:sld xmlns:a="http://schemas.openxmlformats.org/drawingml/2006/main" xmlns:r="http://schemas.openxmlformats.org/officeDocument/2006/relationships" xmlns:p="http://schemas.openxmlformats.org/presentationml/2006/main"><p:cSld><p:spTree><p:nvGrpSpPr><p:cNvPr id="1" name="" /><p:cNvGrpSpPr /><p:nvPr /></p:nvGrpSpPr><p:grpSpPr><a:xfrm><a:off x="0" y="0" /><a:ext cx="0" cy="0" /><a:chOff x="0" y="0" /><a:chExt cx="0" cy="0" /></a:xfrm></p:grpSpPr><p:sp><p:nvSpPr><p:cNvPr id="2" name="Title 1" /><p:cNvSpPr><a:spLocks noGrp="1" /></p:cNvSpPr><p:nvPr><p:ph type="title" /></p:nvPr></p:nvSpPr><p:spPr /><p:txBody><a:bodyPr /><a:lstStyle /><a:p><a:pPr lvl="0" indent="0" marL="0"><a:buNone /></a:pPr><a:r><a:rPr /><a:t>Evaluation Form (from Presenting Team)</a:t></a:r></a:p></p:txBody></p:sp><p:sp><p:nvSpPr><p:cNvPr id="3" name="Content Placeholder 2" /><p:cNvSpPr><a:spLocks noGrp="1" /></p:cNvSpPr><p:nvPr><p:ph idx="1" /></p:nvPr></p:nvSpPr><p:spPr /><p:txBody><a:bodyPr /><a:lstStyle /><a:p><a:pPr lvl="0" /><a:r><a:rPr /><a:t>Link: </a:t></a:r><a:r><a:rPr><a:hlinkClick r:id="rId2" /></a:rPr><a:t>https://forms.gle/mBq7GdZiLTy8Ydhf9</a:t></a:r></a:p><a:p><a:pPr lvl="0" indent="0"><a:buNone /></a:pPr><a:r><a:rPr><a:latin typeface="Courier" /></a:rPr><a:t>NameError: name &#39;qrcode&#39; is not defined
+[31m---------------------------------------------------------------------------[39m
+[31mNameError[39m                                 Traceback (most recent call last)
+[36mCell[39m[36m [39m[32mIn[3][39m[32m, line 4[39m
+[32m      1[39m url=[33m&quot;[39m[33mhttps://forms.gle/mBq7GdZiLTy8Ydhf9[39m[33m&quot;[39m
+[32m      2[39m [38;5;66;03m# Create QR code[39;00m
+[32m----&gt; [39m[32m4[39m qr=[43mqrcode[49m.QRCode(version=[38;5;28;01mNone[39;00m, box_size=[32m10[39m, border=[32m4[39m)
+[32m      5[39m qr.add_data(url)
+[32m      6[39m qr.make(fit=[38;5;28;01mTrue[39;00m)
+
+[31mNameError[39m: name &#39;qrcode&#39; is not defined</a:t></a:r></a:p></p:txBody></p:sp></p:spTree></p:cSld></p:sld>
+</file>
+
+<file path=ppt/slides/slide13.xml><?xml version="1.0" encoding="utf-8"?>
+<p:sld xmlns:a="http://schemas.openxmlformats.org/drawingml/2006/main" xmlns:r="http://schemas.openxmlformats.org/officeDocument/2006/relationships" xmlns:p="http://schemas.openxmlformats.org/presentationml/2006/main">
+  <p:cSld>
+    <p:spTree>
+      <p:nvGrpSpPr>
+        <p:cNvPr id="1" name=""/>
+        <p:cNvGrpSpPr/>
+        <p:nvPr/>
+      </p:nvGrpSpPr>
+      <p:grpSpPr>
+        <a:xfrm>
+          <a:off x="0" y="0"/>
+          <a:ext cx="0" cy="0"/>
+          <a:chOff x="0" y="0"/>
+          <a:chExt cx="0" cy="0"/>
+        </a:xfrm>
+      </p:grpSpPr>
+      <p:sp>
+        <p:nvSpPr>
+          <p:cNvPr id="2" name="Title 1"/>
+          <p:cNvSpPr>
+            <a:spLocks noGrp="1"/>
+          </p:cNvSpPr>
+          <p:nvPr>
+            <p:ph type="title"/>
+          </p:nvPr>
+        </p:nvSpPr>
+        <p:spPr/>
+        <p:txBody>
+          <a:bodyPr/>
+          <a:lstStyle/>
+          <a:p>
+            <a:pPr lvl="0" indent="0" marL="0">
+              <a:buNone/>
+            </a:pPr>
+            <a:r>
+              <a:rPr/>
               <a:t>Credits</a:t>
             </a:r>
           </a:p>
@@ -3295,28 +3343,28 @@
             <a:pPr lvl="1"/>
             <a:r>
               <a:rPr/>
-              <a:t>Anthony Wolfe - Job Title</a:t>
+              <a:t>Anthony Wolfe - Project Coordinator</a:t>
             </a:r>
           </a:p>
           <a:p>
             <a:pPr lvl="1"/>
             <a:r>
               <a:rPr/>
-              <a:t>Dean Callahan - Job Title</a:t>
+              <a:t>Dean Callahan - Technical Lead</a:t>
             </a:r>
           </a:p>
           <a:p>
             <a:pPr lvl="1"/>
             <a:r>
               <a:rPr/>
-              <a:t>Jonathan Juarez - Job Title</a:t>
+              <a:t>Jonathan Juarez - Data Scientist</a:t>
             </a:r>
           </a:p>
           <a:p>
             <a:pPr lvl="1"/>
             <a:r>
               <a:rPr/>
-              <a:t>Devon Walker - Job Title</a:t>
+              <a:t>Devon Walker - Data Scientist</a:t>
             </a:r>
           </a:p>
           <a:p>
@@ -3472,54 +3520,7 @@
             </a:pPr>
             <a:r>
               <a:rPr/>
-              <a:t>Tidy Data Collected</a:t>
-            </a:r>
-          </a:p>
-        </p:txBody>
-      </p:sp>
-    </p:spTree>
-  </p:cSld>
-</p:sld>
-</file>
-
-<file path=ppt/slides/slide6.xml><?xml version="1.0" encoding="utf-8"?>
-<p:sld xmlns:a="http://schemas.openxmlformats.org/drawingml/2006/main" xmlns:r="http://schemas.openxmlformats.org/officeDocument/2006/relationships" xmlns:p="http://schemas.openxmlformats.org/presentationml/2006/main">
-  <p:cSld>
-    <p:spTree>
-      <p:nvGrpSpPr>
-        <p:cNvPr id="1" name=""/>
-        <p:cNvGrpSpPr/>
-        <p:nvPr/>
-      </p:nvGrpSpPr>
-      <p:grpSpPr>
-        <a:xfrm>
-          <a:off x="0" y="0"/>
-          <a:ext cx="0" cy="0"/>
-          <a:chOff x="0" y="0"/>
-          <a:chExt cx="0" cy="0"/>
-        </a:xfrm>
-      </p:grpSpPr>
-      <p:sp>
-        <p:nvSpPr>
-          <p:cNvPr id="2" name="Title 1"/>
-          <p:cNvSpPr>
-            <a:spLocks noGrp="1"/>
-          </p:cNvSpPr>
-          <p:nvPr>
-            <p:ph type="title"/>
-          </p:nvPr>
-        </p:nvSpPr>
-        <p:spPr/>
-        <p:txBody>
-          <a:bodyPr/>
-          <a:lstStyle/>
-          <a:p>
-            <a:pPr lvl="0" indent="0" marL="0">
-              <a:buNone/>
-            </a:pPr>
-            <a:r>
-              <a:rPr/>
-              <a:t>Gower’s Method for Distances Between Clusters</a:t>
+              <a:t>Gower’s for Distances Between Clusters</a:t>
             </a:r>
           </a:p>
         </p:txBody>
@@ -3589,6 +3590,143 @@
 </p:sld>
 </file>
 
+<file path=ppt/slides/slide6.xml><?xml version="1.0" encoding="utf-8"?>
+<p:sld xmlns:a="http://schemas.openxmlformats.org/drawingml/2006/main" xmlns:r="http://schemas.openxmlformats.org/officeDocument/2006/relationships" xmlns:p="http://schemas.openxmlformats.org/presentationml/2006/main">
+  <p:cSld>
+    <p:spTree>
+      <p:nvGrpSpPr>
+        <p:cNvPr id="1" name=""/>
+        <p:cNvGrpSpPr/>
+        <p:nvPr/>
+      </p:nvGrpSpPr>
+      <p:grpSpPr>
+        <a:xfrm>
+          <a:off x="0" y="0"/>
+          <a:ext cx="0" cy="0"/>
+          <a:chOff x="0" y="0"/>
+          <a:chExt cx="0" cy="0"/>
+        </a:xfrm>
+      </p:grpSpPr>
+      <p:sp>
+        <p:nvSpPr>
+          <p:cNvPr id="2" name="Title 1"/>
+          <p:cNvSpPr>
+            <a:spLocks noGrp="1"/>
+          </p:cNvSpPr>
+          <p:nvPr>
+            <p:ph type="title"/>
+          </p:nvPr>
+        </p:nvSpPr>
+        <p:spPr/>
+        <p:txBody>
+          <a:bodyPr/>
+          <a:lstStyle/>
+          <a:p>
+            <a:pPr lvl="0" indent="0" marL="0">
+              <a:buNone/>
+            </a:pPr>
+            <a:r>
+              <a:rPr/>
+              <a:t>How does our distance work between students?</a:t>
+            </a:r>
+          </a:p>
+        </p:txBody>
+      </p:sp>
+      <p:sp>
+        <p:nvSpPr>
+          <p:cNvPr id="3" name="Content Placeholder 2"/>
+          <p:cNvSpPr>
+            <a:spLocks noGrp="1"/>
+          </p:cNvSpPr>
+          <p:nvPr>
+            <p:ph idx="1"/>
+          </p:nvPr>
+        </p:nvSpPr>
+        <p:spPr/>
+        <p:txBody>
+          <a:bodyPr/>
+          <a:lstStyle/>
+          <a:p>
+            <a:pPr lvl="0" indent="0" marL="0">
+              <a:buNone/>
+            </a:pPr>
+            <a:r>
+              <a:rPr/>
+              <a:t>fontsize: 25 We calculate similarity between students based on:</a:t>
+            </a:r>
+          </a:p>
+          <a:p>
+            <a:pPr lvl="0" indent="0" marL="0">
+              <a:buNone/>
+            </a:pPr>
+            <a:r>
+              <a:rPr b="1"/>
+              <a:t>(Numeric variables)</a:t>
+            </a:r>
+            <a:r>
+              <a:rPr/>
+              <a:t> (i.e., studty hours per week, quiz/exam scores) * Measured by normalized numerical difference.</a:t>
+            </a:r>
+          </a:p>
+          <a:p>
+            <a:pPr lvl="0" indent="0" marL="0">
+              <a:buNone/>
+            </a:pPr>
+            <a:r>
+              <a:rPr b="1"/>
+              <a:t>(Categorical variables)</a:t>
+            </a:r>
+            <a:r>
+              <a:rPr/>
+              <a:t> (i.e, major, preffered study style, availability, learning preference). * Measured by 0 if they match, 1 if they differ. Each variable contributes equally or weighted if needed to an overall similarity score.</a:t>
+            </a:r>
+          </a:p>
+          <a:p>
+            <a:pPr lvl="0" indent="0" marL="0">
+              <a:buNone/>
+            </a:pPr>
+            <a:r>
+              <a:rPr b="1"/>
+              <a:t>(Final Distance Score)</a:t>
+            </a:r>
+            <a:r>
+              <a:rPr/>
+              <a:t> Distance ranges from 0 to 1. * 0 = Very similar students * 1 = Very different students</a:t>
+            </a:r>
+          </a:p>
+          <a:p>
+            <a:pPr lvl="0" indent="0" marL="0">
+              <a:buNone/>
+            </a:pPr>
+            <a:r>
+              <a:rPr/>
+              <a:t>Students with </a:t>
+            </a:r>
+            <a:r>
+              <a:rPr b="1"/>
+              <a:t>(smaller distances)</a:t>
+            </a:r>
+            <a:r>
+              <a:rPr/>
+              <a:t> are grouped together in the recommender system to create balanced, compatible study groups.</a:t>
+            </a:r>
+          </a:p>
+          <a:p>
+            <a:pPr lvl="0" indent="0" marL="0">
+              <a:buNone/>
+            </a:pPr>
+            <a:r>
+              <a:rPr/>
+              <a:t>fontsize: 12</a:t>
+            </a:r>
+          </a:p>
+        </p:txBody>
+      </p:sp>
+    </p:spTree>
+  </p:cSld>
+</p:sld>
+</file>
+
 <file path=ppt/slides/slide7.xml><?xml version="1.0" encoding="utf-8"?>
 <p:sld xmlns:a="http://schemas.openxmlformats.org/drawingml/2006/main" xmlns:r="http://schemas.openxmlformats.org/officeDocument/2006/relationships" xmlns:p="http://schemas.openxmlformats.org/presentationml/2006/main">
   <p:cSld>
@@ -3626,7 +3764,7 @@
             </a:pPr>
             <a:r>
               <a:rPr/>
-              <a:t>How distance between students work?</a:t>
+              <a:t>Complete Linkage for Merging Clusters</a:t>
             </a:r>
           </a:p>
         </p:txBody>
@@ -3673,7 +3811,7 @@
             </a:pPr>
             <a:r>
               <a:rPr/>
-              <a:t>Clustering: Linkage Choice</a:t>
+              <a:t>Tidy Data Collected</a:t>
             </a:r>
           </a:p>
         </p:txBody>
@@ -3720,7 +3858,7 @@
             </a:pPr>
             <a:r>
               <a:rPr/>
-              <a:t>Clustering: Code and Dendrogram</a:t>
+              <a:t>Let’s Look at the Code</a:t>
             </a:r>
           </a:p>
         </p:txBody>

</xml_diff>

<commit_message>
fixing qr code slide formatting
</commit_message>
<xml_diff>
--- a/presentation.pptx
+++ b/presentation.pptx
@@ -17,7 +17,6 @@
     <p:sldId id="265" r:id="rId11"/>
     <p:sldId id="266" r:id="rId12"/>
     <p:sldId id="267" r:id="rId13"/>
-    <p:sldId id="268" r:id="rId14"/>
   </p:sldIdLst>
   <p:sldSz cx="9144000" cy="5143500" type="screen16x9"/>
   <p:notesSz cx="6858000" cy="9144000"/>
@@ -3243,12 +3242,7 @@
             <p:ph type="title"/>
           </p:nvPr>
         </p:nvSpPr>
-        <p:spPr>
-          <a:xfrm>
-            <a:off x="457201" y="204787"/>
-            <a:ext cx="3008313" cy="871538"/>
-          </a:xfrm>
-        </p:spPr>
+        <p:spPr/>
         <p:txBody>
           <a:bodyPr/>
           <a:lstStyle/>
@@ -3265,29 +3259,25 @@
       </p:sp>
       <p:sp>
         <p:nvSpPr>
-          <p:cNvPr id="4" name="Text Placeholder 3"/>
-          <p:cNvSpPr>
-            <a:spLocks noGrp="1"/>
-          </p:cNvSpPr>
-          <p:nvPr>
-            <p:ph idx="2" sz="half" type="body"/>
-          </p:nvPr>
-        </p:nvSpPr>
-        <p:spPr/>
-        <p:txBody>
-          <a:bodyPr/>
-          <a:lstStyle/>
-          <a:p>
-            <a:pPr lvl="0"/>
+          <p:cNvPr id="3" name="Content Placeholder 2"/>
+          <p:cNvSpPr>
+            <a:spLocks noGrp="1"/>
+          </p:cNvSpPr>
+          <p:nvPr>
+            <p:ph idx="1" sz="half"/>
+          </p:nvPr>
+        </p:nvSpPr>
+        <p:spPr/>
+        <p:txBody>
+          <a:bodyPr/>
+          <a:lstStyle/>
+          <a:p>
+            <a:pPr lvl="0" indent="0" marL="0">
+              <a:buNone/>
+            </a:pPr>
             <a:r>
               <a:rPr/>
-              <a:t>Link: </a:t>
-            </a:r>
-            <a:r>
-              <a:rPr>
-                <a:hlinkClick r:id="rId2"/>
-              </a:rPr>
-              <a:t>https://forms.gle/mBq7GdZiLTy8Ydhf9</a:t>
+              <a:t>Feedback from the evaluation form will be anonymous, however the results will help us all improve future iterations of our model generalized to all students. ** Ask Rosanna if she wants to share the results to them later on **</a:t>
             </a:r>
           </a:p>
         </p:txBody>
@@ -3301,15 +3291,15 @@
           <p:nvPr/>
         </p:nvPicPr>
         <p:blipFill>
-          <a:blip r:embed="rId3"/>
+          <a:blip r:embed="rId2"/>
           <a:stretch>
             <a:fillRect/>
           </a:stretch>
         </p:blipFill>
         <p:spPr bwMode="auto">
           <a:xfrm>
-            <a:off x="3937000" y="203200"/>
-            <a:ext cx="4381500" cy="4381500"/>
+            <a:off x="4978400" y="1193800"/>
+            <a:ext cx="3390900" cy="3390900"/>
           </a:xfrm>
           <a:prstGeom prst="rect">
             <a:avLst/>
@@ -3364,78 +3354,6 @@
             </a:pPr>
             <a:r>
               <a:rPr/>
-              <a:t>Feedback from the Evaluation Form</a:t>
-            </a:r>
-          </a:p>
-        </p:txBody>
-      </p:sp>
-      <p:sp>
-        <p:nvSpPr>
-          <p:cNvPr id="3" name="Content Placeholder 2"/>
-          <p:cNvSpPr>
-            <a:spLocks noGrp="1"/>
-          </p:cNvSpPr>
-          <p:nvPr>
-            <p:ph idx="1"/>
-          </p:nvPr>
-        </p:nvSpPr>
-        <p:spPr/>
-        <p:txBody>
-          <a:bodyPr/>
-          <a:lstStyle/>
-          <a:p>
-            <a:pPr lvl="0" indent="0" marL="0">
-              <a:buNone/>
-            </a:pPr>
-            <a:r>
-              <a:rPr/>
-              <a:t>Feedback from the evaluation form will be anonymous, however the results will help us all improve future iterations of our model generalized to all students. ** Ask Rosanna if she wants to share the results to them later on **</a:t>
-            </a:r>
-          </a:p>
-        </p:txBody>
-      </p:sp>
-    </p:spTree>
-  </p:cSld>
-</p:sld>
-</file>
-
-<file path=ppt/slides/slide13.xml><?xml version="1.0" encoding="utf-8"?>
-<p:sld xmlns:a="http://schemas.openxmlformats.org/drawingml/2006/main" xmlns:r="http://schemas.openxmlformats.org/officeDocument/2006/relationships" xmlns:p="http://schemas.openxmlformats.org/presentationml/2006/main">
-  <p:cSld>
-    <p:spTree>
-      <p:nvGrpSpPr>
-        <p:cNvPr id="1" name=""/>
-        <p:cNvGrpSpPr/>
-        <p:nvPr/>
-      </p:nvGrpSpPr>
-      <p:grpSpPr>
-        <a:xfrm>
-          <a:off x="0" y="0"/>
-          <a:ext cx="0" cy="0"/>
-          <a:chOff x="0" y="0"/>
-          <a:chExt cx="0" cy="0"/>
-        </a:xfrm>
-      </p:grpSpPr>
-      <p:sp>
-        <p:nvSpPr>
-          <p:cNvPr id="2" name="Title 1"/>
-          <p:cNvSpPr>
-            <a:spLocks noGrp="1"/>
-          </p:cNvSpPr>
-          <p:nvPr>
-            <p:ph type="title"/>
-          </p:nvPr>
-        </p:nvSpPr>
-        <p:spPr/>
-        <p:txBody>
-          <a:bodyPr/>
-          <a:lstStyle/>
-          <a:p>
-            <a:pPr lvl="0" indent="0" marL="0">
-              <a:buNone/>
-            </a:pPr>
-            <a:r>
-              <a:rPr/>
               <a:t>Credits</a:t>
             </a:r>
           </a:p>
@@ -3610,12 +3528,7 @@
             <p:ph type="title"/>
           </p:nvPr>
         </p:nvSpPr>
-        <p:spPr>
-          <a:xfrm>
-            <a:off x="457201" y="204787"/>
-            <a:ext cx="3008313" cy="871538"/>
-          </a:xfrm>
-        </p:spPr>
+        <p:spPr/>
         <p:txBody>
           <a:bodyPr/>
           <a:lstStyle/>
@@ -3632,12 +3545,12 @@
       </p:sp>
       <p:sp>
         <p:nvSpPr>
-          <p:cNvPr id="4" name="Text Placeholder 3"/>
-          <p:cNvSpPr>
-            <a:spLocks noGrp="1"/>
-          </p:cNvSpPr>
-          <p:nvPr>
-            <p:ph idx="2" sz="half" type="body"/>
+          <p:cNvPr id="3" name="Content Placeholder 2"/>
+          <p:cNvSpPr>
+            <a:spLocks noGrp="1"/>
+          </p:cNvSpPr>
+          <p:nvPr>
+            <p:ph idx="1" sz="half"/>
           </p:nvPr>
         </p:nvSpPr>
         <p:spPr/>
@@ -3671,8 +3584,8 @@
         </p:blipFill>
         <p:spPr bwMode="auto">
           <a:xfrm>
-            <a:off x="3937000" y="203200"/>
-            <a:ext cx="4381500" cy="4381500"/>
+            <a:off x="4978400" y="1193800"/>
+            <a:ext cx="3390900" cy="3390900"/>
           </a:xfrm>
           <a:prstGeom prst="rect">
             <a:avLst/>

</xml_diff>

<commit_message>
pushing integrated notebook slides
</commit_message>
<xml_diff>
--- a/presentation.pptx
+++ b/presentation.pptx
@@ -3210,6 +3210,216 @@
           </a:p>
         </p:txBody>
       </p:sp>
+      <p:graphicFrame>
+        <p:nvGraphicFramePr>
+          <p:cNvPr id="6" name="Content Placeholder 5"/>
+          <p:cNvGraphicFramePr>
+            <a:graphicFrameLocks noGrp="1"/>
+          </p:cNvGraphicFramePr>
+          <p:nvPr>
+            <p:ph idx="1"/>
+          </p:nvPr>
+        </p:nvGraphicFramePr>
+        <p:xfrm>
+          <a:off x="457200" y="1193800"/>
+          <a:ext cx="8229600" cy="3390900"/>
+        </p:xfrm>
+        <a:graphic>
+          <a:graphicData uri="http://schemas.openxmlformats.org/drawingml/2006/table">
+            <a:tbl>
+              <a:tblPr firstRow="1" bandRow="1">
+                <a:tableStyleId>{5C22544A-7EE6-4342-B048-85BDC9FD1C3A}</a:tableStyleId>
+              </a:tblPr>
+              <a:tblGrid>
+                <a:gridCol w="4114800"/>
+                <a:gridCol w="4114800"/>
+              </a:tblGrid>
+              <a:tr h="0">
+                <a:tc>
+                  <a:txBody>
+                    <a:bodyPr/>
+                    <a:lstStyle/>
+                    <a:p>
+                      <a:endParaRPr/>
+                    </a:p>
+                  </a:txBody>
+                  <a:tcPr/>
+                </a:tc>
+                <a:tc>
+                  <a:txBody>
+                    <a:bodyPr/>
+                    <a:lstStyle/>
+                    <a:p>
+                      <a:pPr lvl="0" indent="0" marL="0">
+                        <a:buNone/>
+                      </a:pPr>
+                      <a:r>
+                        <a:rPr/>
+                        <a:t>username</a:t>
+                      </a:r>
+                    </a:p>
+                  </a:txBody>
+                  <a:tcPr/>
+                </a:tc>
+              </a:tr>
+              <a:tr h="0">
+                <a:tc>
+                  <a:txBody>
+                    <a:bodyPr/>
+                    <a:lstStyle/>
+                    <a:p>
+                      <a:pPr lvl="0" indent="0" marL="0">
+                        <a:buNone/>
+                      </a:pPr>
+                      <a:r>
+                        <a:rPr/>
+                        <a:t>group</a:t>
+                      </a:r>
+                    </a:p>
+                  </a:txBody>
+                </a:tc>
+                <a:tc>
+                  <a:txBody>
+                    <a:bodyPr/>
+                    <a:lstStyle/>
+                    <a:p>
+                      <a:endParaRPr/>
+                    </a:p>
+                  </a:txBody>
+                </a:tc>
+              </a:tr>
+              <a:tr h="0">
+                <a:tc>
+                  <a:txBody>
+                    <a:bodyPr/>
+                    <a:lstStyle/>
+                    <a:p>
+                      <a:pPr lvl="0" indent="0" marL="0">
+                        <a:buNone/>
+                      </a:pPr>
+                      <a:r>
+                        <a:rPr/>
+                        <a:t>0</a:t>
+                      </a:r>
+                    </a:p>
+                  </a:txBody>
+                </a:tc>
+                <a:tc>
+                  <a:txBody>
+                    <a:bodyPr/>
+                    <a:lstStyle/>
+                    <a:p>
+                      <a:pPr lvl="0" indent="0" marL="0">
+                        <a:buNone/>
+                      </a:pPr>
+                      <a:r>
+                        <a:rPr/>
+                        <a:t>[rta21]</a:t>
+                      </a:r>
+                    </a:p>
+                  </a:txBody>
+                </a:tc>
+              </a:tr>
+              <a:tr h="0">
+                <a:tc>
+                  <a:txBody>
+                    <a:bodyPr/>
+                    <a:lstStyle/>
+                    <a:p>
+                      <a:pPr lvl="0" indent="0" marL="0">
+                        <a:buNone/>
+                      </a:pPr>
+                      <a:r>
+                        <a:rPr/>
+                        <a:t>1</a:t>
+                      </a:r>
+                    </a:p>
+                  </a:txBody>
+                </a:tc>
+                <a:tc>
+                  <a:txBody>
+                    <a:bodyPr/>
+                    <a:lstStyle/>
+                    <a:p>
+                      <a:pPr lvl="0" indent="0" marL="0">
+                        <a:buNone/>
+                      </a:pPr>
+                      <a:r>
+                        <a:rPr/>
+                        <a:t>[pgr12]</a:t>
+                      </a:r>
+                    </a:p>
+                  </a:txBody>
+                </a:tc>
+              </a:tr>
+              <a:tr h="0">
+                <a:tc>
+                  <a:txBody>
+                    <a:bodyPr/>
+                    <a:lstStyle/>
+                    <a:p>
+                      <a:pPr lvl="0" indent="0" marL="0">
+                        <a:buNone/>
+                      </a:pPr>
+                      <a:r>
+                        <a:rPr/>
+                        <a:t>2</a:t>
+                      </a:r>
+                    </a:p>
+                  </a:txBody>
+                </a:tc>
+                <a:tc>
+                  <a:txBody>
+                    <a:bodyPr/>
+                    <a:lstStyle/>
+                    <a:p>
+                      <a:pPr lvl="0" indent="0" marL="0">
+                        <a:buNone/>
+                      </a:pPr>
+                      <a:r>
+                        <a:rPr/>
+                        <a:t>[jna45]</a:t>
+                      </a:r>
+                    </a:p>
+                  </a:txBody>
+                </a:tc>
+              </a:tr>
+              <a:tr h="0">
+                <a:tc>
+                  <a:txBody>
+                    <a:bodyPr/>
+                    <a:lstStyle/>
+                    <a:p>
+                      <a:pPr lvl="0" indent="0" marL="0">
+                        <a:buNone/>
+                      </a:pPr>
+                      <a:r>
+                        <a:rPr/>
+                        <a:t>3</a:t>
+                      </a:r>
+                    </a:p>
+                  </a:txBody>
+                </a:tc>
+                <a:tc>
+                  <a:txBody>
+                    <a:bodyPr/>
+                    <a:lstStyle/>
+                    <a:p>
+                      <a:pPr lvl="0" indent="0" marL="0">
+                        <a:buNone/>
+                      </a:pPr>
+                      <a:r>
+                        <a:rPr/>
+                        <a:t>[ks612]</a:t>
+                      </a:r>
+                    </a:p>
+                  </a:txBody>
+                </a:tc>
+              </a:tr>
+            </a:tbl>
+          </a:graphicData>
+        </a:graphic>
+      </p:graphicFrame>
     </p:spTree>
   </p:cSld>
 </p:sld>
@@ -3284,7 +3494,7 @@
       </p:sp>
       <p:pic>
         <p:nvPicPr>
-          <p:cNvPr descr="presentation_files/figure-pptx/cell-4-output-1.png" id="0" name="Picture 1"/>
+          <p:cNvPr descr="presentation_files/figure-pptx/cell-16-output-1.png" id="0" name="Picture 1"/>
           <p:cNvPicPr>
             <a:picLocks noGrp="1" noChangeAspect="1"/>
           </p:cNvPicPr>
@@ -3317,28 +3527,116 @@
 </p:sld>
 </file>
 
-<file path=ppt/slides/slide12.xml><?xml version="1.0" encoding="UTF-8"?><p:sld xmlns:a="http://schemas.openxmlformats.org/drawingml/2006/main" xmlns:r="http://schemas.openxmlformats.org/officeDocument/2006/relationships" xmlns:p="http://schemas.openxmlformats.org/presentationml/2006/main"><p:cSld><p:spTree><p:nvGrpSpPr><p:cNvPr id="1" name="" /><p:cNvGrpSpPr /><p:nvPr /></p:nvGrpSpPr><p:grpSpPr><a:xfrm><a:off x="0" y="0" /><a:ext cx="0" cy="0" /><a:chOff x="0" y="0" /><a:chExt cx="0" cy="0" /></a:xfrm></p:grpSpPr><p:sp><p:nvSpPr><p:cNvPr id="2" name="Title 1" /><p:cNvSpPr><a:spLocks noGrp="1" /></p:cNvSpPr><p:nvPr><p:ph type="title" /></p:nvPr></p:nvSpPr><p:spPr /><p:txBody><a:bodyPr /><a:lstStyle /><a:p><a:pPr lvl="0" indent="0" marL="0"><a:buNone /></a:pPr><a:r><a:rPr /><a:t>Credits</a:t></a:r></a:p></p:txBody></p:sp><p:sp><p:nvSpPr><p:cNvPr id="3" name="Content Placeholder 2" /><p:cNvSpPr><a:spLocks noGrp="1" /></p:cNvSpPr><p:nvPr><p:ph idx="1" /></p:nvPr></p:nvSpPr><p:spPr /><p:txBody><a:bodyPr /><a:lstStyle /><a:p><a:pPr lvl="0" /><a:r><a:rPr /><a:t>Presented by Team Machines:</a:t></a:r></a:p><a:p><a:pPr lvl="1" /><a:r><a:rPr /><a:t>Anthony Wolfe - Project Coordinator</a:t></a:r></a:p><a:p><a:pPr lvl="1" /><a:r><a:rPr /><a:t>Dean Callahan - Technical Lead</a:t></a:r></a:p><a:p><a:pPr lvl="1" /><a:r><a:rPr /><a:t>Jonathan Juarez - Data Scientist</a:t></a:r></a:p><a:p><a:pPr lvl="1" /><a:r><a:rPr /><a:t>Devon Walker - Data Scientist</a:t></a:r></a:p><a:p><a:pPr lvl="0" /><a:r><a:rPr /><a:t>Data and Question Design By: Team SARA</a:t></a:r></a:p><a:p><a:pPr lvl="0" /><a:r><a:rPr /><a:t>Distance and Clustering By: Team Errors</a:t></a:r></a:p><a:p><a:pPr lvl="0" indent="0"><a:buNone /></a:pPr><a:r><a:rPr><a:latin typeface="Courier" /></a:rPr><a:t>ModuleNotFoundError: No module named &#39;google.colab&#39;
-[31m---------------------------------------------------------------------------[39m
-[31mModuleNotFoundError[39m                       Traceback (most recent call last)
-[36mCell[39m[36m [39m[32mIn[4][39m[32m, line 2[39m
-[32m      1[39m [38;5;66;03m#!pip install google-auth google-auth-oauthlib google-auth-httplib2 google-api-python-client[39;00m
-[32m----&gt; [39m[32m2[39m [38;5;28;01mfrom[39;00m[38;5;250m [39m[34;01mgoogle[39;00m[34;01m.[39;00m[34;01mcolab[39;00m[38;5;250m [39m[38;5;28;01mimport[39;00m auth
-[32m      3[39m auth.authenticate_user()
-[32m      4[39m [38;5;28;01mimport[39;00m[38;5;250m [39m[34;01mgspread[39;00m
-
-[31mModuleNotFoundError[39m: No module named &#39;google.colab&#39;</a:t></a:r></a:p><a:p><a:pPr lvl="0" indent="0"><a:buNone /></a:pPr><a:r><a:rPr><a:latin typeface="Courier" /></a:rPr><a:t>NameError: name &#39;gc&#39; is not defined
-[31m---------------------------------------------------------------------------[39m
-[31mNameError[39m                                 Traceback (most recent call last)
-[36mCell[39m[36m [39m[32mIn[5][39m[32m, line 4[39m
-[32m      1[39m [38;5;66;03m# import data from google survey[39;00m
-[32m      2[39m 
-[32m      3[39m [38;5;66;03m# real one[39;00m
-[32m----&gt; [39m[32m4[39m wb = [43mgc[49m.open_by_url([33m&#39;[39m[33mhttps://docs.google.com/spreadsheets/d/1IxP1wH9CJMFxqZI-ZSt8q-EcQtlF5mnP-btR4SKDWV4/edit?gid=804837988#gid=804837988[39m[33m&#39;[39m)
-[32m      6[39m [38;5;66;03m# simulated[39;00m
-[32m      7[39m [38;5;66;03m# wb = gc.open_by_url(&#39;https://docs.google.com/spreadsheets/d/1fiIOkwfttAIv5P0ca6IcVdAk5IAG-WrThyriQiXPRIQ/edit?gid=1707814890#gid=1707814890&#39;)[39;00m
-[32m      9[39m sheet = wb.sheet1
-
-[31mNameError[39m: name &#39;gc&#39; is not defined</a:t></a:r></a:p></p:txBody></p:sp></p:spTree></p:cSld></p:sld>
+<file path=ppt/slides/slide12.xml><?xml version="1.0" encoding="utf-8"?>
+<p:sld xmlns:a="http://schemas.openxmlformats.org/drawingml/2006/main" xmlns:r="http://schemas.openxmlformats.org/officeDocument/2006/relationships" xmlns:p="http://schemas.openxmlformats.org/presentationml/2006/main">
+  <p:cSld>
+    <p:spTree>
+      <p:nvGrpSpPr>
+        <p:cNvPr id="1" name=""/>
+        <p:cNvGrpSpPr/>
+        <p:nvPr/>
+      </p:nvGrpSpPr>
+      <p:grpSpPr>
+        <a:xfrm>
+          <a:off x="0" y="0"/>
+          <a:ext cx="0" cy="0"/>
+          <a:chOff x="0" y="0"/>
+          <a:chExt cx="0" cy="0"/>
+        </a:xfrm>
+      </p:grpSpPr>
+      <p:sp>
+        <p:nvSpPr>
+          <p:cNvPr id="2" name="Title 1"/>
+          <p:cNvSpPr>
+            <a:spLocks noGrp="1"/>
+          </p:cNvSpPr>
+          <p:nvPr>
+            <p:ph type="title"/>
+          </p:nvPr>
+        </p:nvSpPr>
+        <p:spPr/>
+        <p:txBody>
+          <a:bodyPr/>
+          <a:lstStyle/>
+          <a:p>
+            <a:pPr lvl="0" indent="0" marL="0">
+              <a:buNone/>
+            </a:pPr>
+            <a:r>
+              <a:rPr/>
+              <a:t>Credits</a:t>
+            </a:r>
+          </a:p>
+        </p:txBody>
+      </p:sp>
+      <p:sp>
+        <p:nvSpPr>
+          <p:cNvPr id="3" name="Content Placeholder 2"/>
+          <p:cNvSpPr>
+            <a:spLocks noGrp="1"/>
+          </p:cNvSpPr>
+          <p:nvPr>
+            <p:ph idx="1"/>
+          </p:nvPr>
+        </p:nvSpPr>
+        <p:spPr/>
+        <p:txBody>
+          <a:bodyPr/>
+          <a:lstStyle/>
+          <a:p>
+            <a:pPr lvl="0"/>
+            <a:r>
+              <a:rPr/>
+              <a:t>Presented by Team Machines:</a:t>
+            </a:r>
+          </a:p>
+          <a:p>
+            <a:pPr lvl="1"/>
+            <a:r>
+              <a:rPr/>
+              <a:t>Anthony Wolfe - Project Coordinator</a:t>
+            </a:r>
+          </a:p>
+          <a:p>
+            <a:pPr lvl="1"/>
+            <a:r>
+              <a:rPr/>
+              <a:t>Dean Callahan - Technical Lead</a:t>
+            </a:r>
+          </a:p>
+          <a:p>
+            <a:pPr lvl="1"/>
+            <a:r>
+              <a:rPr/>
+              <a:t>Jonathan Juarez - Data Scientist</a:t>
+            </a:r>
+          </a:p>
+          <a:p>
+            <a:pPr lvl="1"/>
+            <a:r>
+              <a:rPr/>
+              <a:t>Devon Walker - Data Scientist</a:t>
+            </a:r>
+          </a:p>
+          <a:p>
+            <a:pPr lvl="0"/>
+            <a:r>
+              <a:rPr/>
+              <a:t>Data and Question Design By: Team SARA</a:t>
+            </a:r>
+          </a:p>
+          <a:p>
+            <a:pPr lvl="0"/>
+            <a:r>
+              <a:rPr/>
+              <a:t>Distance and Clustering By: Team Errors</a:t>
+            </a:r>
+          </a:p>
+        </p:txBody>
+      </p:sp>
+    </p:spTree>
+  </p:cSld>
+</p:sld>
 </file>
 
 <file path=ppt/slides/slide2.xml><?xml version="1.0" encoding="utf-8"?>
@@ -4021,11 +4319,41 @@
             </a:pPr>
             <a:r>
               <a:rPr/>
-              <a:t>Let’s Look at the Code</a:t>
-            </a:r>
-          </a:p>
-        </p:txBody>
-      </p:sp>
+              <a:t>Our Results Visualized as a Dendrogram</a:t>
+            </a:r>
+          </a:p>
+        </p:txBody>
+      </p:sp>
+      <p:pic>
+        <p:nvPicPr>
+          <p:cNvPr descr="presentation_files/figure-pptx/cell-13-output-1.png" id="0" name="Picture 1"/>
+          <p:cNvPicPr>
+            <a:picLocks noGrp="1" noChangeAspect="1"/>
+          </p:cNvPicPr>
+          <p:nvPr/>
+        </p:nvPicPr>
+        <p:blipFill>
+          <a:blip r:embed="rId2"/>
+          <a:stretch>
+            <a:fillRect/>
+          </a:stretch>
+        </p:blipFill>
+        <p:spPr bwMode="auto">
+          <a:xfrm>
+            <a:off x="2540000" y="1193800"/>
+            <a:ext cx="4064000" cy="3390900"/>
+          </a:xfrm>
+          <a:prstGeom prst="rect">
+            <a:avLst/>
+          </a:prstGeom>
+          <a:noFill/>
+          <a:ln w="9525">
+            <a:noFill/>
+            <a:headEnd/>
+            <a:tailEnd/>
+          </a:ln>
+        </p:spPr>
+      </p:pic>
     </p:spTree>
   </p:cSld>
 </p:sld>
@@ -4068,7 +4396,39 @@
             </a:pPr>
             <a:r>
               <a:rPr/>
-              <a:t>Our Results Visualized as a Dendrogram</a:t>
+              <a:t>Study Group Sizes</a:t>
+            </a:r>
+          </a:p>
+        </p:txBody>
+      </p:sp>
+      <p:sp>
+        <p:nvSpPr>
+          <p:cNvPr id="3" name="Content Placeholder 2"/>
+          <p:cNvSpPr>
+            <a:spLocks noGrp="1"/>
+          </p:cNvSpPr>
+          <p:nvPr>
+            <p:ph idx="1"/>
+          </p:nvPr>
+        </p:nvSpPr>
+        <p:spPr/>
+        <p:txBody>
+          <a:bodyPr/>
+          <a:lstStyle/>
+          <a:p>
+            <a:pPr lvl="0" indent="0">
+              <a:buNone/>
+            </a:pPr>
+            <a:r>
+              <a:rPr>
+                <a:latin typeface="Courier"/>
+              </a:rPr>
+              <a:t>clusters
+0    1
+1    1
+2    1
+3    1
+dtype: int64</a:t>
             </a:r>
           </a:p>
         </p:txBody>

</xml_diff>

<commit_message>
changing title of a slide
</commit_message>
<xml_diff>
--- a/presentation.pptx
+++ b/presentation.pptx
@@ -3227,8 +3227,8 @@
         </p:blipFill>
         <p:spPr bwMode="auto">
           <a:xfrm>
-            <a:off x="1943100" y="1193800"/>
-            <a:ext cx="5270500" cy="3390900"/>
+            <a:off x="1981200" y="1193800"/>
+            <a:ext cx="5181600" cy="3390900"/>
           </a:xfrm>
           <a:prstGeom prst="rect">
             <a:avLst/>
@@ -3283,7 +3283,7 @@
             </a:pPr>
             <a:r>
               <a:rPr/>
-              <a:t>Group Recommendations and Student Assignment</a:t>
+              <a:t>Group Assignment</a:t>
             </a:r>
           </a:p>
         </p:txBody>
@@ -3392,7 +3392,7 @@
                       </a:pPr>
                       <a:r>
                         <a:rPr/>
-                        <a:t>[rta21]</a:t>
+                        <a:t>[rta21, rta21]</a:t>
                       </a:r>
                     </a:p>
                   </a:txBody>
@@ -3424,7 +3424,7 @@
                       </a:pPr>
                       <a:r>
                         <a:rPr/>
-                        <a:t>[pgr12]</a:t>
+                        <a:t>[pgr12, pgr12]</a:t>
                       </a:r>
                     </a:p>
                   </a:txBody>
@@ -3456,7 +3456,7 @@
                       </a:pPr>
                       <a:r>
                         <a:rPr/>
-                        <a:t>[jna45]</a:t>
+                        <a:t>[jna45, jna45]</a:t>
                       </a:r>
                     </a:p>
                   </a:txBody>
@@ -3488,6 +3488,230 @@
                       </a:pPr>
                       <a:r>
                         <a:rPr/>
+                        <a:t>[ks612, dpc8, ks612, dpc43, ks612, dpc43]</a:t>
+                      </a:r>
+                    </a:p>
+                  </a:txBody>
+                </a:tc>
+              </a:tr>
+              <a:tr h="0">
+                <a:tc>
+                  <a:txBody>
+                    <a:bodyPr/>
+                    <a:lstStyle/>
+                    <a:p>
+                      <a:pPr lvl="0" indent="0" marL="0">
+                        <a:buNone/>
+                      </a:pPr>
+                      <a:r>
+                        <a:rPr/>
+                        <a:t>4</a:t>
+                      </a:r>
+                    </a:p>
+                  </a:txBody>
+                </a:tc>
+                <a:tc>
+                  <a:txBody>
+                    <a:bodyPr/>
+                    <a:lstStyle/>
+                    <a:p>
+                      <a:pPr lvl="0" indent="0" marL="0">
+                        <a:buNone/>
+                      </a:pPr>
+                      <a:r>
+                        <a:rPr/>
+                        <a:t>[rta21]</a:t>
+                      </a:r>
+                    </a:p>
+                  </a:txBody>
+                </a:tc>
+              </a:tr>
+              <a:tr h="0">
+                <a:tc>
+                  <a:txBody>
+                    <a:bodyPr/>
+                    <a:lstStyle/>
+                    <a:p>
+                      <a:pPr lvl="0" indent="0" marL="0">
+                        <a:buNone/>
+                      </a:pPr>
+                      <a:r>
+                        <a:rPr/>
+                        <a:t>5</a:t>
+                      </a:r>
+                    </a:p>
+                  </a:txBody>
+                </a:tc>
+                <a:tc>
+                  <a:txBody>
+                    <a:bodyPr/>
+                    <a:lstStyle/>
+                    <a:p>
+                      <a:pPr lvl="0" indent="0" marL="0">
+                        <a:buNone/>
+                      </a:pPr>
+                      <a:r>
+                        <a:rPr/>
+                        <a:t>[pgr12]</a:t>
+                      </a:r>
+                    </a:p>
+                  </a:txBody>
+                </a:tc>
+              </a:tr>
+              <a:tr h="0">
+                <a:tc>
+                  <a:txBody>
+                    <a:bodyPr/>
+                    <a:lstStyle/>
+                    <a:p>
+                      <a:pPr lvl="0" indent="0" marL="0">
+                        <a:buNone/>
+                      </a:pPr>
+                      <a:r>
+                        <a:rPr/>
+                        <a:t>6</a:t>
+                      </a:r>
+                    </a:p>
+                  </a:txBody>
+                </a:tc>
+                <a:tc>
+                  <a:txBody>
+                    <a:bodyPr/>
+                    <a:lstStyle/>
+                    <a:p>
+                      <a:pPr lvl="0" indent="0" marL="0">
+                        <a:buNone/>
+                      </a:pPr>
+                      <a:r>
+                        <a:rPr/>
+                        <a:t>[jna45]</a:t>
+                      </a:r>
+                    </a:p>
+                  </a:txBody>
+                </a:tc>
+              </a:tr>
+              <a:tr h="0">
+                <a:tc>
+                  <a:txBody>
+                    <a:bodyPr/>
+                    <a:lstStyle/>
+                    <a:p>
+                      <a:pPr lvl="0" indent="0" marL="0">
+                        <a:buNone/>
+                      </a:pPr>
+                      <a:r>
+                        <a:rPr/>
+                        <a:t>7</a:t>
+                      </a:r>
+                    </a:p>
+                  </a:txBody>
+                </a:tc>
+                <a:tc>
+                  <a:txBody>
+                    <a:bodyPr/>
+                    <a:lstStyle/>
+                    <a:p>
+                      <a:pPr lvl="0" indent="0" marL="0">
+                        <a:buNone/>
+                      </a:pPr>
+                      <a:r>
+                        <a:rPr/>
+                        <a:t>[rta21]</a:t>
+                      </a:r>
+                    </a:p>
+                  </a:txBody>
+                </a:tc>
+              </a:tr>
+              <a:tr h="0">
+                <a:tc>
+                  <a:txBody>
+                    <a:bodyPr/>
+                    <a:lstStyle/>
+                    <a:p>
+                      <a:pPr lvl="0" indent="0" marL="0">
+                        <a:buNone/>
+                      </a:pPr>
+                      <a:r>
+                        <a:rPr/>
+                        <a:t>8</a:t>
+                      </a:r>
+                    </a:p>
+                  </a:txBody>
+                </a:tc>
+                <a:tc>
+                  <a:txBody>
+                    <a:bodyPr/>
+                    <a:lstStyle/>
+                    <a:p>
+                      <a:pPr lvl="0" indent="0" marL="0">
+                        <a:buNone/>
+                      </a:pPr>
+                      <a:r>
+                        <a:rPr/>
+                        <a:t>[pgr12]</a:t>
+                      </a:r>
+                    </a:p>
+                  </a:txBody>
+                </a:tc>
+              </a:tr>
+              <a:tr h="0">
+                <a:tc>
+                  <a:txBody>
+                    <a:bodyPr/>
+                    <a:lstStyle/>
+                    <a:p>
+                      <a:pPr lvl="0" indent="0" marL="0">
+                        <a:buNone/>
+                      </a:pPr>
+                      <a:r>
+                        <a:rPr/>
+                        <a:t>9</a:t>
+                      </a:r>
+                    </a:p>
+                  </a:txBody>
+                </a:tc>
+                <a:tc>
+                  <a:txBody>
+                    <a:bodyPr/>
+                    <a:lstStyle/>
+                    <a:p>
+                      <a:pPr lvl="0" indent="0" marL="0">
+                        <a:buNone/>
+                      </a:pPr>
+                      <a:r>
+                        <a:rPr/>
+                        <a:t>[jna45]</a:t>
+                      </a:r>
+                    </a:p>
+                  </a:txBody>
+                </a:tc>
+              </a:tr>
+              <a:tr h="0">
+                <a:tc>
+                  <a:txBody>
+                    <a:bodyPr/>
+                    <a:lstStyle/>
+                    <a:p>
+                      <a:pPr lvl="0" indent="0" marL="0">
+                        <a:buNone/>
+                      </a:pPr>
+                      <a:r>
+                        <a:rPr/>
+                        <a:t>10</a:t>
+                      </a:r>
+                    </a:p>
+                  </a:txBody>
+                </a:tc>
+                <a:tc>
+                  <a:txBody>
+                    <a:bodyPr/>
+                    <a:lstStyle/>
+                    <a:p>
+                      <a:pPr lvl="0" indent="0" marL="0">
+                        <a:buNone/>
+                      </a:pPr>
+                      <a:r>
+                        <a:rPr/>
                         <a:t>[ks612]</a:t>
                       </a:r>
                     </a:p>
@@ -3505,7 +3729,7 @@
                       </a:pPr>
                       <a:r>
                         <a:rPr/>
-                        <a:t>4</a:t>
+                        <a:t>11</a:t>
                       </a:r>
                     </a:p>
                   </a:txBody>
@@ -3597,7 +3821,7 @@
             </a:pPr>
             <a:r>
               <a:rPr/>
-              <a:t>Feedback from the evaluation form will be anonymous, however the results will help us all improve future iterations of our model generalized to all students. ** Ask Rosanna if she wants to share the results to them later on **</a:t>
+              <a:t>Feedback from the evaluation form will be anonymous, however the results will help us all improve future iterations of our model generalized to all students.</a:t>
             </a:r>
           </a:p>
         </p:txBody>
@@ -4513,8 +4737,8 @@
         </p:blipFill>
         <p:spPr bwMode="auto">
           <a:xfrm>
-            <a:off x="2540000" y="1193800"/>
-            <a:ext cx="4064000" cy="3390900"/>
+            <a:off x="2514600" y="1193800"/>
+            <a:ext cx="4127500" cy="3390900"/>
           </a:xfrm>
           <a:prstGeom prst="rect">
             <a:avLst/>

</xml_diff>